<commit_message>
Reintegrate OpenCL support to trunk
Subversion: revision:8109
</commit_message>
<xml_diff>
--- a/doc/images/score-p-overview.pptx
+++ b/doc/images/score-p-overview.pptx
@@ -104,6 +104,11 @@
       </a:defRPr>
     </a:lvl9pPr>
   </p:defaultTextStyle>
+  <p:extLst>
+    <p:ext uri="{EFAFB233-063F-42B5-8137-9DF3F51BA10A}">
+      <p15:sldGuideLst xmlns:p15="http://schemas.microsoft.com/office/powerpoint/2012/main"/>
+    </p:ext>
+  </p:extLst>
 </p:presentation>
 </file>
 
@@ -238,7 +243,7 @@
           <a:p>
             <a:fld id="{B805A886-7B5C-4891-93D1-29873BD06F24}" type="datetimeFigureOut">
               <a:rPr lang="de-DE" smtClean="0"/>
-              <a:t>01.07.2014</a:t>
+              <a:t>17.12.2014</a:t>
             </a:fld>
             <a:endParaRPr lang="de-DE"/>
           </a:p>
@@ -408,7 +413,7 @@
           <a:p>
             <a:fld id="{B805A886-7B5C-4891-93D1-29873BD06F24}" type="datetimeFigureOut">
               <a:rPr lang="de-DE" smtClean="0"/>
-              <a:t>01.07.2014</a:t>
+              <a:t>17.12.2014</a:t>
             </a:fld>
             <a:endParaRPr lang="de-DE"/>
           </a:p>
@@ -588,7 +593,7 @@
           <a:p>
             <a:fld id="{B805A886-7B5C-4891-93D1-29873BD06F24}" type="datetimeFigureOut">
               <a:rPr lang="de-DE" smtClean="0"/>
-              <a:t>01.07.2014</a:t>
+              <a:t>17.12.2014</a:t>
             </a:fld>
             <a:endParaRPr lang="de-DE"/>
           </a:p>
@@ -758,7 +763,7 @@
           <a:p>
             <a:fld id="{B805A886-7B5C-4891-93D1-29873BD06F24}" type="datetimeFigureOut">
               <a:rPr lang="de-DE" smtClean="0"/>
-              <a:t>01.07.2014</a:t>
+              <a:t>17.12.2014</a:t>
             </a:fld>
             <a:endParaRPr lang="de-DE"/>
           </a:p>
@@ -1002,7 +1007,7 @@
           <a:p>
             <a:fld id="{B805A886-7B5C-4891-93D1-29873BD06F24}" type="datetimeFigureOut">
               <a:rPr lang="de-DE" smtClean="0"/>
-              <a:t>01.07.2014</a:t>
+              <a:t>17.12.2014</a:t>
             </a:fld>
             <a:endParaRPr lang="de-DE"/>
           </a:p>
@@ -1234,7 +1239,7 @@
           <a:p>
             <a:fld id="{B805A886-7B5C-4891-93D1-29873BD06F24}" type="datetimeFigureOut">
               <a:rPr lang="de-DE" smtClean="0"/>
-              <a:t>01.07.2014</a:t>
+              <a:t>17.12.2014</a:t>
             </a:fld>
             <a:endParaRPr lang="de-DE"/>
           </a:p>
@@ -1601,7 +1606,7 @@
           <a:p>
             <a:fld id="{B805A886-7B5C-4891-93D1-29873BD06F24}" type="datetimeFigureOut">
               <a:rPr lang="de-DE" smtClean="0"/>
-              <a:t>01.07.2014</a:t>
+              <a:t>17.12.2014</a:t>
             </a:fld>
             <a:endParaRPr lang="de-DE"/>
           </a:p>
@@ -1719,7 +1724,7 @@
           <a:p>
             <a:fld id="{B805A886-7B5C-4891-93D1-29873BD06F24}" type="datetimeFigureOut">
               <a:rPr lang="de-DE" smtClean="0"/>
-              <a:t>01.07.2014</a:t>
+              <a:t>17.12.2014</a:t>
             </a:fld>
             <a:endParaRPr lang="de-DE"/>
           </a:p>
@@ -1814,7 +1819,7 @@
           <a:p>
             <a:fld id="{B805A886-7B5C-4891-93D1-29873BD06F24}" type="datetimeFigureOut">
               <a:rPr lang="de-DE" smtClean="0"/>
-              <a:t>01.07.2014</a:t>
+              <a:t>17.12.2014</a:t>
             </a:fld>
             <a:endParaRPr lang="de-DE"/>
           </a:p>
@@ -2091,7 +2096,7 @@
           <a:p>
             <a:fld id="{B805A886-7B5C-4891-93D1-29873BD06F24}" type="datetimeFigureOut">
               <a:rPr lang="de-DE" smtClean="0"/>
-              <a:t>01.07.2014</a:t>
+              <a:t>17.12.2014</a:t>
             </a:fld>
             <a:endParaRPr lang="de-DE"/>
           </a:p>
@@ -2348,7 +2353,7 @@
           <a:p>
             <a:fld id="{B805A886-7B5C-4891-93D1-29873BD06F24}" type="datetimeFigureOut">
               <a:rPr lang="de-DE" smtClean="0"/>
-              <a:t>01.07.2014</a:t>
+              <a:t>17.12.2014</a:t>
             </a:fld>
             <a:endParaRPr lang="de-DE"/>
           </a:p>
@@ -2561,7 +2566,7 @@
           <a:p>
             <a:fld id="{B805A886-7B5C-4891-93D1-29873BD06F24}" type="datetimeFigureOut">
               <a:rPr lang="de-DE" smtClean="0"/>
-              <a:t>01.07.2014</a:t>
+              <a:t>17.12.2014</a:t>
             </a:fld>
             <a:endParaRPr lang="de-DE"/>
           </a:p>
@@ -3189,11 +3194,6 @@
                 </a:rPr>
                 <a:t>Application</a:t>
               </a:r>
-              <a:endParaRPr lang="en-US" sz="2000" dirty="0">
-                <a:latin typeface="Arial" pitchFamily="34"/>
-                <a:ea typeface="Arial Unicode MS" pitchFamily="2"/>
-                <a:cs typeface="Arial" pitchFamily="34"/>
-              </a:endParaRPr>
             </a:p>
           </p:txBody>
         </p:sp>
@@ -5744,7 +5744,29 @@
                   <a:ea typeface="Arial Unicode MS" pitchFamily="2"/>
                   <a:cs typeface="Tahoma" pitchFamily="2"/>
                 </a:rPr>
-                <a:t>(CUDA)</a:t>
+                <a:t>(</a:t>
+              </a:r>
+              <a:r>
+                <a:rPr lang="en-US" sz="1200" smtClean="0">
+                  <a:solidFill>
+                    <a:srgbClr val="FFFFFF"/>
+                  </a:solidFill>
+                  <a:latin typeface="Arial" pitchFamily="34"/>
+                  <a:ea typeface="Arial Unicode MS" pitchFamily="2"/>
+                  <a:cs typeface="Tahoma" pitchFamily="2"/>
+                </a:rPr>
+                <a:t>CUDA, OpenCL</a:t>
+              </a:r>
+              <a:r>
+                <a:rPr lang="en-US" sz="1200" dirty="0" smtClean="0">
+                  <a:solidFill>
+                    <a:srgbClr val="FFFFFF"/>
+                  </a:solidFill>
+                  <a:latin typeface="Arial" pitchFamily="34"/>
+                  <a:ea typeface="Arial Unicode MS" pitchFamily="2"/>
+                  <a:cs typeface="Tahoma" pitchFamily="2"/>
+                </a:rPr>
+                <a:t>)</a:t>
               </a:r>
               <a:endParaRPr lang="en-US" sz="1200" dirty="0">
                 <a:solidFill>
@@ -5965,29 +5987,7 @@
                   <a:ea typeface="Arial Unicode MS" pitchFamily="2"/>
                   <a:cs typeface="Tahoma" pitchFamily="2"/>
                 </a:rPr>
-                <a:t>Score-P </a:t>
-              </a:r>
-              <a:r>
-                <a:rPr lang="en-US" sz="2000" dirty="0">
-                  <a:solidFill>
-                    <a:srgbClr val="000000"/>
-                  </a:solidFill>
-                  <a:latin typeface="Arial" pitchFamily="34"/>
-                  <a:ea typeface="Arial Unicode MS" pitchFamily="2"/>
-                  <a:cs typeface="Tahoma" pitchFamily="2"/>
-                </a:rPr>
-                <a:t>measurement </a:t>
-              </a:r>
-              <a:r>
-                <a:rPr lang="en-US" sz="2000" dirty="0">
-                  <a:solidFill>
-                    <a:srgbClr val="000000"/>
-                  </a:solidFill>
-                  <a:latin typeface="Arial" pitchFamily="34"/>
-                  <a:ea typeface="Arial Unicode MS" pitchFamily="2"/>
-                  <a:cs typeface="Tahoma" pitchFamily="2"/>
-                </a:rPr>
-                <a:t>infrastructure</a:t>
+                <a:t>Score-P measurement infrastructure</a:t>
               </a:r>
               <a:endParaRPr lang="en-US" sz="2000" dirty="0">
                 <a:solidFill>
@@ -6423,14 +6423,6 @@
                 </a:rPr>
                 <a:t>User instrumentation</a:t>
               </a:r>
-              <a:endParaRPr lang="en-US" sz="1200" dirty="0">
-                <a:solidFill>
-                  <a:srgbClr val="FFFFFF"/>
-                </a:solidFill>
-                <a:latin typeface="Arial" pitchFamily="34"/>
-                <a:ea typeface="Arial Unicode MS" pitchFamily="2"/>
-                <a:cs typeface="Tahoma" pitchFamily="2"/>
-              </a:endParaRPr>
             </a:p>
           </p:txBody>
         </p:sp>
@@ -8569,14 +8561,6 @@
                 </a:rPr>
                 <a:t>(MPI, SHMEM)</a:t>
               </a:r>
-              <a:endParaRPr lang="en-US" sz="1200" dirty="0">
-                <a:solidFill>
-                  <a:srgbClr val="FFFFFF"/>
-                </a:solidFill>
-                <a:latin typeface="Arial" pitchFamily="34"/>
-                <a:ea typeface="Arial Unicode MS" pitchFamily="2"/>
-                <a:cs typeface="Tahoma" pitchFamily="2"/>
-              </a:endParaRPr>
             </a:p>
           </p:txBody>
         </p:sp>
@@ -9102,14 +9086,6 @@
                 </a:rPr>
                 <a:t>)</a:t>
               </a:r>
-              <a:endParaRPr lang="en-US" sz="1200" dirty="0">
-                <a:solidFill>
-                  <a:srgbClr val="FFFFFF"/>
-                </a:solidFill>
-                <a:latin typeface="Arial" pitchFamily="34"/>
-                <a:ea typeface="Arial Unicode MS" pitchFamily="2"/>
-                <a:cs typeface="Tahoma" pitchFamily="2"/>
-              </a:endParaRPr>
             </a:p>
           </p:txBody>
         </p:sp>
@@ -9538,14 +9514,6 @@
                 </a:rPr>
                 <a:t>Source code instrumentation</a:t>
               </a:r>
-              <a:endParaRPr lang="en-US" sz="1200" dirty="0">
-                <a:solidFill>
-                  <a:srgbClr val="FFFFFF"/>
-                </a:solidFill>
-                <a:latin typeface="Arial" pitchFamily="34"/>
-                <a:ea typeface="Arial Unicode MS" pitchFamily="2"/>
-                <a:cs typeface="Tahoma" pitchFamily="2"/>
-              </a:endParaRPr>
             </a:p>
           </p:txBody>
         </p:sp>
@@ -9759,14 +9727,6 @@
                 </a:rPr>
                 <a:t>CUBE</a:t>
               </a:r>
-              <a:endParaRPr lang="en-US" dirty="0">
-                <a:solidFill>
-                  <a:srgbClr val="FFFFFF"/>
-                </a:solidFill>
-                <a:latin typeface="Arial" pitchFamily="34"/>
-                <a:ea typeface="Arial Unicode MS" pitchFamily="2"/>
-                <a:cs typeface="Tahoma" pitchFamily="2"/>
-              </a:endParaRPr>
             </a:p>
           </p:txBody>
         </p:sp>

</xml_diff>

<commit_message>
Adding PERF and plugins to `Hardware counter`.
Subversion: revision:9617
</commit_message>
<xml_diff>
--- a/doc/images/score-p-overview.pptx
+++ b/doc/images/score-p-overview.pptx
@@ -106,7 +106,7 @@
   </p:defaultTextStyle>
   <p:extLst>
     <p:ext uri="{EFAFB233-063F-42B5-8137-9DF3F51BA10A}">
-      <p15:sldGuideLst xmlns:p15="http://schemas.microsoft.com/office/powerpoint/2012/main"/>
+      <p15:sldGuideLst xmlns:p15="http://schemas.microsoft.com/office/powerpoint/2012/main" xmlns=""/>
     </p:ext>
   </p:extLst>
 </p:presentation>
@@ -243,7 +243,7 @@
           <a:p>
             <a:fld id="{B805A886-7B5C-4891-93D1-29873BD06F24}" type="datetimeFigureOut">
               <a:rPr lang="de-DE" smtClean="0"/>
-              <a:t>17.12.2014</a:t>
+              <a:t>09.12.2015</a:t>
             </a:fld>
             <a:endParaRPr lang="de-DE"/>
           </a:p>
@@ -285,7 +285,7 @@
           <a:p>
             <a:fld id="{C3FA991F-5CFE-4265-BA0A-3C6CB9B1C845}" type="slidenum">
               <a:rPr lang="de-DE" smtClean="0"/>
-              <a:t>‹Nr.›</a:t>
+              <a:t>‹#›</a:t>
             </a:fld>
             <a:endParaRPr lang="de-DE"/>
           </a:p>
@@ -413,7 +413,7 @@
           <a:p>
             <a:fld id="{B805A886-7B5C-4891-93D1-29873BD06F24}" type="datetimeFigureOut">
               <a:rPr lang="de-DE" smtClean="0"/>
-              <a:t>17.12.2014</a:t>
+              <a:t>09.12.2015</a:t>
             </a:fld>
             <a:endParaRPr lang="de-DE"/>
           </a:p>
@@ -455,7 +455,7 @@
           <a:p>
             <a:fld id="{C3FA991F-5CFE-4265-BA0A-3C6CB9B1C845}" type="slidenum">
               <a:rPr lang="de-DE" smtClean="0"/>
-              <a:t>‹Nr.›</a:t>
+              <a:t>‹#›</a:t>
             </a:fld>
             <a:endParaRPr lang="de-DE"/>
           </a:p>
@@ -593,7 +593,7 @@
           <a:p>
             <a:fld id="{B805A886-7B5C-4891-93D1-29873BD06F24}" type="datetimeFigureOut">
               <a:rPr lang="de-DE" smtClean="0"/>
-              <a:t>17.12.2014</a:t>
+              <a:t>09.12.2015</a:t>
             </a:fld>
             <a:endParaRPr lang="de-DE"/>
           </a:p>
@@ -635,7 +635,7 @@
           <a:p>
             <a:fld id="{C3FA991F-5CFE-4265-BA0A-3C6CB9B1C845}" type="slidenum">
               <a:rPr lang="de-DE" smtClean="0"/>
-              <a:t>‹Nr.›</a:t>
+              <a:t>‹#›</a:t>
             </a:fld>
             <a:endParaRPr lang="de-DE"/>
           </a:p>
@@ -763,7 +763,7 @@
           <a:p>
             <a:fld id="{B805A886-7B5C-4891-93D1-29873BD06F24}" type="datetimeFigureOut">
               <a:rPr lang="de-DE" smtClean="0"/>
-              <a:t>17.12.2014</a:t>
+              <a:t>09.12.2015</a:t>
             </a:fld>
             <a:endParaRPr lang="de-DE"/>
           </a:p>
@@ -805,7 +805,7 @@
           <a:p>
             <a:fld id="{C3FA991F-5CFE-4265-BA0A-3C6CB9B1C845}" type="slidenum">
               <a:rPr lang="de-DE" smtClean="0"/>
-              <a:t>‹Nr.›</a:t>
+              <a:t>‹#›</a:t>
             </a:fld>
             <a:endParaRPr lang="de-DE"/>
           </a:p>
@@ -1007,7 +1007,7 @@
           <a:p>
             <a:fld id="{B805A886-7B5C-4891-93D1-29873BD06F24}" type="datetimeFigureOut">
               <a:rPr lang="de-DE" smtClean="0"/>
-              <a:t>17.12.2014</a:t>
+              <a:t>09.12.2015</a:t>
             </a:fld>
             <a:endParaRPr lang="de-DE"/>
           </a:p>
@@ -1049,7 +1049,7 @@
           <a:p>
             <a:fld id="{C3FA991F-5CFE-4265-BA0A-3C6CB9B1C845}" type="slidenum">
               <a:rPr lang="de-DE" smtClean="0"/>
-              <a:t>‹Nr.›</a:t>
+              <a:t>‹#›</a:t>
             </a:fld>
             <a:endParaRPr lang="de-DE"/>
           </a:p>
@@ -1239,7 +1239,7 @@
           <a:p>
             <a:fld id="{B805A886-7B5C-4891-93D1-29873BD06F24}" type="datetimeFigureOut">
               <a:rPr lang="de-DE" smtClean="0"/>
-              <a:t>17.12.2014</a:t>
+              <a:t>09.12.2015</a:t>
             </a:fld>
             <a:endParaRPr lang="de-DE"/>
           </a:p>
@@ -1281,7 +1281,7 @@
           <a:p>
             <a:fld id="{C3FA991F-5CFE-4265-BA0A-3C6CB9B1C845}" type="slidenum">
               <a:rPr lang="de-DE" smtClean="0"/>
-              <a:t>‹Nr.›</a:t>
+              <a:t>‹#›</a:t>
             </a:fld>
             <a:endParaRPr lang="de-DE"/>
           </a:p>
@@ -1606,7 +1606,7 @@
           <a:p>
             <a:fld id="{B805A886-7B5C-4891-93D1-29873BD06F24}" type="datetimeFigureOut">
               <a:rPr lang="de-DE" smtClean="0"/>
-              <a:t>17.12.2014</a:t>
+              <a:t>09.12.2015</a:t>
             </a:fld>
             <a:endParaRPr lang="de-DE"/>
           </a:p>
@@ -1648,7 +1648,7 @@
           <a:p>
             <a:fld id="{C3FA991F-5CFE-4265-BA0A-3C6CB9B1C845}" type="slidenum">
               <a:rPr lang="de-DE" smtClean="0"/>
-              <a:t>‹Nr.›</a:t>
+              <a:t>‹#›</a:t>
             </a:fld>
             <a:endParaRPr lang="de-DE"/>
           </a:p>
@@ -1724,7 +1724,7 @@
           <a:p>
             <a:fld id="{B805A886-7B5C-4891-93D1-29873BD06F24}" type="datetimeFigureOut">
               <a:rPr lang="de-DE" smtClean="0"/>
-              <a:t>17.12.2014</a:t>
+              <a:t>09.12.2015</a:t>
             </a:fld>
             <a:endParaRPr lang="de-DE"/>
           </a:p>
@@ -1766,7 +1766,7 @@
           <a:p>
             <a:fld id="{C3FA991F-5CFE-4265-BA0A-3C6CB9B1C845}" type="slidenum">
               <a:rPr lang="de-DE" smtClean="0"/>
-              <a:t>‹Nr.›</a:t>
+              <a:t>‹#›</a:t>
             </a:fld>
             <a:endParaRPr lang="de-DE"/>
           </a:p>
@@ -1819,7 +1819,7 @@
           <a:p>
             <a:fld id="{B805A886-7B5C-4891-93D1-29873BD06F24}" type="datetimeFigureOut">
               <a:rPr lang="de-DE" smtClean="0"/>
-              <a:t>17.12.2014</a:t>
+              <a:t>09.12.2015</a:t>
             </a:fld>
             <a:endParaRPr lang="de-DE"/>
           </a:p>
@@ -1861,7 +1861,7 @@
           <a:p>
             <a:fld id="{C3FA991F-5CFE-4265-BA0A-3C6CB9B1C845}" type="slidenum">
               <a:rPr lang="de-DE" smtClean="0"/>
-              <a:t>‹Nr.›</a:t>
+              <a:t>‹#›</a:t>
             </a:fld>
             <a:endParaRPr lang="de-DE"/>
           </a:p>
@@ -2096,7 +2096,7 @@
           <a:p>
             <a:fld id="{B805A886-7B5C-4891-93D1-29873BD06F24}" type="datetimeFigureOut">
               <a:rPr lang="de-DE" smtClean="0"/>
-              <a:t>17.12.2014</a:t>
+              <a:t>09.12.2015</a:t>
             </a:fld>
             <a:endParaRPr lang="de-DE"/>
           </a:p>
@@ -2138,7 +2138,7 @@
           <a:p>
             <a:fld id="{C3FA991F-5CFE-4265-BA0A-3C6CB9B1C845}" type="slidenum">
               <a:rPr lang="de-DE" smtClean="0"/>
-              <a:t>‹Nr.›</a:t>
+              <a:t>‹#›</a:t>
             </a:fld>
             <a:endParaRPr lang="de-DE"/>
           </a:p>
@@ -2353,7 +2353,7 @@
           <a:p>
             <a:fld id="{B805A886-7B5C-4891-93D1-29873BD06F24}" type="datetimeFigureOut">
               <a:rPr lang="de-DE" smtClean="0"/>
-              <a:t>17.12.2014</a:t>
+              <a:t>09.12.2015</a:t>
             </a:fld>
             <a:endParaRPr lang="de-DE"/>
           </a:p>
@@ -2395,7 +2395,7 @@
           <a:p>
             <a:fld id="{C3FA991F-5CFE-4265-BA0A-3C6CB9B1C845}" type="slidenum">
               <a:rPr lang="de-DE" smtClean="0"/>
-              <a:t>‹Nr.›</a:t>
+              <a:t>‹#›</a:t>
             </a:fld>
             <a:endParaRPr lang="de-DE"/>
           </a:p>
@@ -2566,7 +2566,7 @@
           <a:p>
             <a:fld id="{B805A886-7B5C-4891-93D1-29873BD06F24}" type="datetimeFigureOut">
               <a:rPr lang="de-DE" smtClean="0"/>
-              <a:t>17.12.2014</a:t>
+              <a:t>09.12.2015</a:t>
             </a:fld>
             <a:endParaRPr lang="de-DE"/>
           </a:p>
@@ -2644,7 +2644,7 @@
           <a:p>
             <a:fld id="{C3FA991F-5CFE-4265-BA0A-3C6CB9B1C845}" type="slidenum">
               <a:rPr lang="de-DE" smtClean="0"/>
-              <a:t>‹Nr.›</a:t>
+              <a:t>‹#›</a:t>
             </a:fld>
             <a:endParaRPr lang="de-DE"/>
           </a:p>
@@ -5747,7 +5747,7 @@
                 <a:t>(</a:t>
               </a:r>
               <a:r>
-                <a:rPr lang="en-US" sz="1200" smtClean="0">
+                <a:rPr lang="en-US" sz="1200" dirty="0" smtClean="0">
                   <a:solidFill>
                     <a:srgbClr val="FFFFFF"/>
                   </a:solidFill>
@@ -5755,18 +5755,7 @@
                   <a:ea typeface="Arial Unicode MS" pitchFamily="2"/>
                   <a:cs typeface="Tahoma" pitchFamily="2"/>
                 </a:rPr>
-                <a:t>CUDA, OpenCL</a:t>
-              </a:r>
-              <a:r>
-                <a:rPr lang="en-US" sz="1200" dirty="0" smtClean="0">
-                  <a:solidFill>
-                    <a:srgbClr val="FFFFFF"/>
-                  </a:solidFill>
-                  <a:latin typeface="Arial" pitchFamily="34"/>
-                  <a:ea typeface="Arial Unicode MS" pitchFamily="2"/>
-                  <a:cs typeface="Tahoma" pitchFamily="2"/>
-                </a:rPr>
-                <a:t>)</a:t>
+                <a:t>CUDA, OpenCL)</a:t>
               </a:r>
               <a:endParaRPr lang="en-US" sz="1200" dirty="0">
                 <a:solidFill>
@@ -7801,7 +7790,7 @@
                 <a:defRPr/>
               </a:pPr>
               <a:r>
-                <a:rPr lang="en-US" sz="1600" dirty="0">
+                <a:rPr lang="en-US" sz="1200" dirty="0">
                   <a:solidFill>
                     <a:srgbClr val="FFFFFF"/>
                   </a:solidFill>
@@ -7812,7 +7801,7 @@
                 <a:t>Hardware counter (PAPI, </a:t>
               </a:r>
               <a:r>
-                <a:rPr lang="en-US" sz="1600" dirty="0" err="1">
+                <a:rPr lang="en-US" sz="1200" dirty="0" err="1" smtClean="0">
                   <a:solidFill>
                     <a:srgbClr val="FFFFFF"/>
                   </a:solidFill>
@@ -7823,7 +7812,7 @@
                 <a:t>rusage</a:t>
               </a:r>
               <a:r>
-                <a:rPr lang="en-US" sz="1600" dirty="0">
+                <a:rPr lang="en-US" sz="1200" dirty="0" smtClean="0">
                   <a:solidFill>
                     <a:srgbClr val="FFFFFF"/>
                   </a:solidFill>
@@ -7831,8 +7820,16 @@
                   <a:ea typeface="Arial Unicode MS" pitchFamily="2"/>
                   <a:cs typeface="Tahoma" pitchFamily="2"/>
                 </a:rPr>
-                <a:t>)</a:t>
+                <a:t>, PERF, plugins)</a:t>
               </a:r>
+              <a:endParaRPr lang="en-US" sz="1200" dirty="0">
+                <a:solidFill>
+                  <a:srgbClr val="FFFFFF"/>
+                </a:solidFill>
+                <a:latin typeface="Arial" pitchFamily="34"/>
+                <a:ea typeface="Arial Unicode MS" pitchFamily="2"/>
+                <a:cs typeface="Tahoma" pitchFamily="2"/>
+              </a:endParaRPr>
             </a:p>
           </p:txBody>
         </p:sp>
@@ -10872,7 +10869,7 @@
   <a:extraClrSchemeLst/>
   <a:extLst>
     <a:ext uri="{05A4C25C-085E-4340-85A3-A5531E510DB2}">
-      <thm15:themeFamily xmlns:thm15="http://schemas.microsoft.com/office/thememl/2012/main" name="Office Theme" id="{62F939B6-93AF-4DB8-9C6B-D6C7DFDC589F}" vid="{4A3C46E8-61CC-4603-A589-7422A47A8E4A}"/>
+      <thm15:themeFamily xmlns:thm15="http://schemas.microsoft.com/office/thememl/2012/main" xmlns="" name="Office Theme" id="{62F939B6-93AF-4DB8-9C6B-D6C7DFDC589F}" vid="{4A3C46E8-61CC-4603-A589-7422A47A8E4A}"/>
     </a:ext>
   </a:extLst>
 </a:theme>

</xml_diff>

<commit_message>
Add sampling to Score-P architecture overview
Subversion: revision:9888
</commit_message>
<xml_diff>
--- a/doc/images/score-p-overview.pptx
+++ b/doc/images/score-p-overview.pptx
@@ -106,7 +106,7 @@
   </p:defaultTextStyle>
   <p:extLst>
     <p:ext uri="{EFAFB233-063F-42B5-8137-9DF3F51BA10A}">
-      <p15:sldGuideLst xmlns:p15="http://schemas.microsoft.com/office/powerpoint/2012/main" xmlns=""/>
+      <p15:sldGuideLst xmlns="" xmlns:p15="http://schemas.microsoft.com/office/powerpoint/2012/main"/>
     </p:ext>
   </p:extLst>
 </p:presentation>
@@ -243,7 +243,7 @@
           <a:p>
             <a:fld id="{B805A886-7B5C-4891-93D1-29873BD06F24}" type="datetimeFigureOut">
               <a:rPr lang="de-DE" smtClean="0"/>
-              <a:t>09.12.2015</a:t>
+              <a:t>10.12.2015</a:t>
             </a:fld>
             <a:endParaRPr lang="de-DE"/>
           </a:p>
@@ -285,7 +285,7 @@
           <a:p>
             <a:fld id="{C3FA991F-5CFE-4265-BA0A-3C6CB9B1C845}" type="slidenum">
               <a:rPr lang="de-DE" smtClean="0"/>
-              <a:t>‹#›</a:t>
+              <a:t>‹Nr.›</a:t>
             </a:fld>
             <a:endParaRPr lang="de-DE"/>
           </a:p>
@@ -413,7 +413,7 @@
           <a:p>
             <a:fld id="{B805A886-7B5C-4891-93D1-29873BD06F24}" type="datetimeFigureOut">
               <a:rPr lang="de-DE" smtClean="0"/>
-              <a:t>09.12.2015</a:t>
+              <a:t>10.12.2015</a:t>
             </a:fld>
             <a:endParaRPr lang="de-DE"/>
           </a:p>
@@ -455,7 +455,7 @@
           <a:p>
             <a:fld id="{C3FA991F-5CFE-4265-BA0A-3C6CB9B1C845}" type="slidenum">
               <a:rPr lang="de-DE" smtClean="0"/>
-              <a:t>‹#›</a:t>
+              <a:t>‹Nr.›</a:t>
             </a:fld>
             <a:endParaRPr lang="de-DE"/>
           </a:p>
@@ -593,7 +593,7 @@
           <a:p>
             <a:fld id="{B805A886-7B5C-4891-93D1-29873BD06F24}" type="datetimeFigureOut">
               <a:rPr lang="de-DE" smtClean="0"/>
-              <a:t>09.12.2015</a:t>
+              <a:t>10.12.2015</a:t>
             </a:fld>
             <a:endParaRPr lang="de-DE"/>
           </a:p>
@@ -635,7 +635,7 @@
           <a:p>
             <a:fld id="{C3FA991F-5CFE-4265-BA0A-3C6CB9B1C845}" type="slidenum">
               <a:rPr lang="de-DE" smtClean="0"/>
-              <a:t>‹#›</a:t>
+              <a:t>‹Nr.›</a:t>
             </a:fld>
             <a:endParaRPr lang="de-DE"/>
           </a:p>
@@ -763,7 +763,7 @@
           <a:p>
             <a:fld id="{B805A886-7B5C-4891-93D1-29873BD06F24}" type="datetimeFigureOut">
               <a:rPr lang="de-DE" smtClean="0"/>
-              <a:t>09.12.2015</a:t>
+              <a:t>10.12.2015</a:t>
             </a:fld>
             <a:endParaRPr lang="de-DE"/>
           </a:p>
@@ -805,7 +805,7 @@
           <a:p>
             <a:fld id="{C3FA991F-5CFE-4265-BA0A-3C6CB9B1C845}" type="slidenum">
               <a:rPr lang="de-DE" smtClean="0"/>
-              <a:t>‹#›</a:t>
+              <a:t>‹Nr.›</a:t>
             </a:fld>
             <a:endParaRPr lang="de-DE"/>
           </a:p>
@@ -1007,7 +1007,7 @@
           <a:p>
             <a:fld id="{B805A886-7B5C-4891-93D1-29873BD06F24}" type="datetimeFigureOut">
               <a:rPr lang="de-DE" smtClean="0"/>
-              <a:t>09.12.2015</a:t>
+              <a:t>10.12.2015</a:t>
             </a:fld>
             <a:endParaRPr lang="de-DE"/>
           </a:p>
@@ -1049,7 +1049,7 @@
           <a:p>
             <a:fld id="{C3FA991F-5CFE-4265-BA0A-3C6CB9B1C845}" type="slidenum">
               <a:rPr lang="de-DE" smtClean="0"/>
-              <a:t>‹#›</a:t>
+              <a:t>‹Nr.›</a:t>
             </a:fld>
             <a:endParaRPr lang="de-DE"/>
           </a:p>
@@ -1239,7 +1239,7 @@
           <a:p>
             <a:fld id="{B805A886-7B5C-4891-93D1-29873BD06F24}" type="datetimeFigureOut">
               <a:rPr lang="de-DE" smtClean="0"/>
-              <a:t>09.12.2015</a:t>
+              <a:t>10.12.2015</a:t>
             </a:fld>
             <a:endParaRPr lang="de-DE"/>
           </a:p>
@@ -1281,7 +1281,7 @@
           <a:p>
             <a:fld id="{C3FA991F-5CFE-4265-BA0A-3C6CB9B1C845}" type="slidenum">
               <a:rPr lang="de-DE" smtClean="0"/>
-              <a:t>‹#›</a:t>
+              <a:t>‹Nr.›</a:t>
             </a:fld>
             <a:endParaRPr lang="de-DE"/>
           </a:p>
@@ -1606,7 +1606,7 @@
           <a:p>
             <a:fld id="{B805A886-7B5C-4891-93D1-29873BD06F24}" type="datetimeFigureOut">
               <a:rPr lang="de-DE" smtClean="0"/>
-              <a:t>09.12.2015</a:t>
+              <a:t>10.12.2015</a:t>
             </a:fld>
             <a:endParaRPr lang="de-DE"/>
           </a:p>
@@ -1648,7 +1648,7 @@
           <a:p>
             <a:fld id="{C3FA991F-5CFE-4265-BA0A-3C6CB9B1C845}" type="slidenum">
               <a:rPr lang="de-DE" smtClean="0"/>
-              <a:t>‹#›</a:t>
+              <a:t>‹Nr.›</a:t>
             </a:fld>
             <a:endParaRPr lang="de-DE"/>
           </a:p>
@@ -1724,7 +1724,7 @@
           <a:p>
             <a:fld id="{B805A886-7B5C-4891-93D1-29873BD06F24}" type="datetimeFigureOut">
               <a:rPr lang="de-DE" smtClean="0"/>
-              <a:t>09.12.2015</a:t>
+              <a:t>10.12.2015</a:t>
             </a:fld>
             <a:endParaRPr lang="de-DE"/>
           </a:p>
@@ -1766,7 +1766,7 @@
           <a:p>
             <a:fld id="{C3FA991F-5CFE-4265-BA0A-3C6CB9B1C845}" type="slidenum">
               <a:rPr lang="de-DE" smtClean="0"/>
-              <a:t>‹#›</a:t>
+              <a:t>‹Nr.›</a:t>
             </a:fld>
             <a:endParaRPr lang="de-DE"/>
           </a:p>
@@ -1819,7 +1819,7 @@
           <a:p>
             <a:fld id="{B805A886-7B5C-4891-93D1-29873BD06F24}" type="datetimeFigureOut">
               <a:rPr lang="de-DE" smtClean="0"/>
-              <a:t>09.12.2015</a:t>
+              <a:t>10.12.2015</a:t>
             </a:fld>
             <a:endParaRPr lang="de-DE"/>
           </a:p>
@@ -1861,7 +1861,7 @@
           <a:p>
             <a:fld id="{C3FA991F-5CFE-4265-BA0A-3C6CB9B1C845}" type="slidenum">
               <a:rPr lang="de-DE" smtClean="0"/>
-              <a:t>‹#›</a:t>
+              <a:t>‹Nr.›</a:t>
             </a:fld>
             <a:endParaRPr lang="de-DE"/>
           </a:p>
@@ -2096,7 +2096,7 @@
           <a:p>
             <a:fld id="{B805A886-7B5C-4891-93D1-29873BD06F24}" type="datetimeFigureOut">
               <a:rPr lang="de-DE" smtClean="0"/>
-              <a:t>09.12.2015</a:t>
+              <a:t>10.12.2015</a:t>
             </a:fld>
             <a:endParaRPr lang="de-DE"/>
           </a:p>
@@ -2138,7 +2138,7 @@
           <a:p>
             <a:fld id="{C3FA991F-5CFE-4265-BA0A-3C6CB9B1C845}" type="slidenum">
               <a:rPr lang="de-DE" smtClean="0"/>
-              <a:t>‹#›</a:t>
+              <a:t>‹Nr.›</a:t>
             </a:fld>
             <a:endParaRPr lang="de-DE"/>
           </a:p>
@@ -2353,7 +2353,7 @@
           <a:p>
             <a:fld id="{B805A886-7B5C-4891-93D1-29873BD06F24}" type="datetimeFigureOut">
               <a:rPr lang="de-DE" smtClean="0"/>
-              <a:t>09.12.2015</a:t>
+              <a:t>10.12.2015</a:t>
             </a:fld>
             <a:endParaRPr lang="de-DE"/>
           </a:p>
@@ -2395,7 +2395,7 @@
           <a:p>
             <a:fld id="{C3FA991F-5CFE-4265-BA0A-3C6CB9B1C845}" type="slidenum">
               <a:rPr lang="de-DE" smtClean="0"/>
-              <a:t>‹#›</a:t>
+              <a:t>‹Nr.›</a:t>
             </a:fld>
             <a:endParaRPr lang="de-DE"/>
           </a:p>
@@ -2566,7 +2566,7 @@
           <a:p>
             <a:fld id="{B805A886-7B5C-4891-93D1-29873BD06F24}" type="datetimeFigureOut">
               <a:rPr lang="de-DE" smtClean="0"/>
-              <a:t>09.12.2015</a:t>
+              <a:t>10.12.2015</a:t>
             </a:fld>
             <a:endParaRPr lang="de-DE"/>
           </a:p>
@@ -2644,7 +2644,7 @@
           <a:p>
             <a:fld id="{C3FA991F-5CFE-4265-BA0A-3C6CB9B1C845}" type="slidenum">
               <a:rPr lang="de-DE" smtClean="0"/>
-              <a:t>‹#›</a:t>
+              <a:t>‹Nr.›</a:t>
             </a:fld>
             <a:endParaRPr lang="de-DE"/>
           </a:p>
@@ -6257,7 +6257,7 @@
               </a:pathLst>
             </a:custGeom>
             <a:solidFill>
-              <a:srgbClr val="008000"/>
+              <a:srgbClr val="376092"/>
             </a:solidFill>
             <a:ln w="9360">
               <a:noFill/>
@@ -6266,131 +6266,7 @@
           </p:spPr>
           <p:txBody>
             <a:bodyPr lIns="90000" tIns="45000" rIns="90000" bIns="45000" anchor="ctr" compatLnSpc="0"/>
-            <a:lstStyle>
-              <a:defPPr>
-                <a:defRPr lang="en-US"/>
-              </a:defPPr>
-              <a:lvl1pPr algn="l" rtl="0" fontAlgn="base">
-                <a:spcBef>
-                  <a:spcPct val="0"/>
-                </a:spcBef>
-                <a:spcAft>
-                  <a:spcPct val="0"/>
-                </a:spcAft>
-                <a:defRPr kern="1200">
-                  <a:solidFill>
-                    <a:schemeClr val="tx1"/>
-                  </a:solidFill>
-                  <a:latin typeface="Arial" pitchFamily="34" charset="0"/>
-                  <a:ea typeface="ＭＳ Ｐゴシック" pitchFamily="34" charset="-128"/>
-                  <a:cs typeface="+mn-cs"/>
-                </a:defRPr>
-              </a:lvl1pPr>
-              <a:lvl2pPr marL="457200" algn="l" rtl="0" fontAlgn="base">
-                <a:spcBef>
-                  <a:spcPct val="0"/>
-                </a:spcBef>
-                <a:spcAft>
-                  <a:spcPct val="0"/>
-                </a:spcAft>
-                <a:defRPr kern="1200">
-                  <a:solidFill>
-                    <a:schemeClr val="tx1"/>
-                  </a:solidFill>
-                  <a:latin typeface="Arial" pitchFamily="34" charset="0"/>
-                  <a:ea typeface="ＭＳ Ｐゴシック" pitchFamily="34" charset="-128"/>
-                  <a:cs typeface="+mn-cs"/>
-                </a:defRPr>
-              </a:lvl2pPr>
-              <a:lvl3pPr marL="914400" algn="l" rtl="0" fontAlgn="base">
-                <a:spcBef>
-                  <a:spcPct val="0"/>
-                </a:spcBef>
-                <a:spcAft>
-                  <a:spcPct val="0"/>
-                </a:spcAft>
-                <a:defRPr kern="1200">
-                  <a:solidFill>
-                    <a:schemeClr val="tx1"/>
-                  </a:solidFill>
-                  <a:latin typeface="Arial" pitchFamily="34" charset="0"/>
-                  <a:ea typeface="ＭＳ Ｐゴシック" pitchFamily="34" charset="-128"/>
-                  <a:cs typeface="+mn-cs"/>
-                </a:defRPr>
-              </a:lvl3pPr>
-              <a:lvl4pPr marL="1371600" algn="l" rtl="0" fontAlgn="base">
-                <a:spcBef>
-                  <a:spcPct val="0"/>
-                </a:spcBef>
-                <a:spcAft>
-                  <a:spcPct val="0"/>
-                </a:spcAft>
-                <a:defRPr kern="1200">
-                  <a:solidFill>
-                    <a:schemeClr val="tx1"/>
-                  </a:solidFill>
-                  <a:latin typeface="Arial" pitchFamily="34" charset="0"/>
-                  <a:ea typeface="ＭＳ Ｐゴシック" pitchFamily="34" charset="-128"/>
-                  <a:cs typeface="+mn-cs"/>
-                </a:defRPr>
-              </a:lvl4pPr>
-              <a:lvl5pPr marL="1828800" algn="l" rtl="0" fontAlgn="base">
-                <a:spcBef>
-                  <a:spcPct val="0"/>
-                </a:spcBef>
-                <a:spcAft>
-                  <a:spcPct val="0"/>
-                </a:spcAft>
-                <a:defRPr kern="1200">
-                  <a:solidFill>
-                    <a:schemeClr val="tx1"/>
-                  </a:solidFill>
-                  <a:latin typeface="Arial" pitchFamily="34" charset="0"/>
-                  <a:ea typeface="ＭＳ Ｐゴシック" pitchFamily="34" charset="-128"/>
-                  <a:cs typeface="+mn-cs"/>
-                </a:defRPr>
-              </a:lvl5pPr>
-              <a:lvl6pPr marL="2286000" algn="l" defTabSz="914400" rtl="0" eaLnBrk="1" latinLnBrk="0" hangingPunct="1">
-                <a:defRPr kern="1200">
-                  <a:solidFill>
-                    <a:schemeClr val="tx1"/>
-                  </a:solidFill>
-                  <a:latin typeface="Arial" pitchFamily="34" charset="0"/>
-                  <a:ea typeface="ＭＳ Ｐゴシック" pitchFamily="34" charset="-128"/>
-                  <a:cs typeface="+mn-cs"/>
-                </a:defRPr>
-              </a:lvl6pPr>
-              <a:lvl7pPr marL="2743200" algn="l" defTabSz="914400" rtl="0" eaLnBrk="1" latinLnBrk="0" hangingPunct="1">
-                <a:defRPr kern="1200">
-                  <a:solidFill>
-                    <a:schemeClr val="tx1"/>
-                  </a:solidFill>
-                  <a:latin typeface="Arial" pitchFamily="34" charset="0"/>
-                  <a:ea typeface="ＭＳ Ｐゴシック" pitchFamily="34" charset="-128"/>
-                  <a:cs typeface="+mn-cs"/>
-                </a:defRPr>
-              </a:lvl7pPr>
-              <a:lvl8pPr marL="3200400" algn="l" defTabSz="914400" rtl="0" eaLnBrk="1" latinLnBrk="0" hangingPunct="1">
-                <a:defRPr kern="1200">
-                  <a:solidFill>
-                    <a:schemeClr val="tx1"/>
-                  </a:solidFill>
-                  <a:latin typeface="Arial" pitchFamily="34" charset="0"/>
-                  <a:ea typeface="ＭＳ Ｐゴシック" pitchFamily="34" charset="-128"/>
-                  <a:cs typeface="+mn-cs"/>
-                </a:defRPr>
-              </a:lvl8pPr>
-              <a:lvl9pPr marL="3657600" algn="l" defTabSz="914400" rtl="0" eaLnBrk="1" latinLnBrk="0" hangingPunct="1">
-                <a:defRPr kern="1200">
-                  <a:solidFill>
-                    <a:schemeClr val="tx1"/>
-                  </a:solidFill>
-                  <a:latin typeface="Arial" pitchFamily="34" charset="0"/>
-                  <a:ea typeface="ＭＳ Ｐゴシック" pitchFamily="34" charset="-128"/>
-                  <a:cs typeface="+mn-cs"/>
-                </a:defRPr>
-              </a:lvl9pPr>
-            </a:lstStyle>
+            <a:lstStyle/>
             <a:p>
               <a:pPr algn="ctr">
                 <a:spcBef>
@@ -6410,8 +6286,60 @@
                   <a:ea typeface="Arial Unicode MS" pitchFamily="2"/>
                   <a:cs typeface="Tahoma" pitchFamily="2"/>
                 </a:rPr>
-                <a:t>User instrumentation</a:t>
+                <a:t>Sampling</a:t>
               </a:r>
+            </a:p>
+            <a:p>
+              <a:pPr algn="ctr">
+                <a:spcBef>
+                  <a:spcPts val="0"/>
+                </a:spcBef>
+                <a:spcAft>
+                  <a:spcPts val="0"/>
+                </a:spcAft>
+                <a:defRPr/>
+              </a:pPr>
+              <a:r>
+                <a:rPr lang="en-US" sz="1200" dirty="0">
+                  <a:solidFill>
+                    <a:srgbClr val="FFFFFF"/>
+                  </a:solidFill>
+                  <a:latin typeface="Arial" pitchFamily="34"/>
+                  <a:ea typeface="Arial Unicode MS" pitchFamily="2"/>
+                  <a:cs typeface="Tahoma" pitchFamily="2"/>
+                </a:rPr>
+                <a:t>Interrupts</a:t>
+              </a:r>
+            </a:p>
+            <a:p>
+              <a:pPr algn="ctr">
+                <a:spcBef>
+                  <a:spcPts val="0"/>
+                </a:spcBef>
+                <a:spcAft>
+                  <a:spcPts val="0"/>
+                </a:spcAft>
+                <a:defRPr/>
+              </a:pPr>
+              <a:r>
+                <a:rPr lang="en-US" sz="1200" dirty="0">
+                  <a:solidFill>
+                    <a:srgbClr val="FFFFFF"/>
+                  </a:solidFill>
+                  <a:latin typeface="Arial" pitchFamily="34"/>
+                  <a:ea typeface="Arial Unicode MS" pitchFamily="2"/>
+                  <a:cs typeface="Tahoma" pitchFamily="2"/>
+                </a:rPr>
+                <a:t>(PAPI, PERF)</a:t>
+              </a:r>
+              <a:endParaRPr lang="en-US" sz="1200" dirty="0">
+                <a:solidFill>
+                  <a:srgbClr val="FFFFFF"/>
+                </a:solidFill>
+                <a:latin typeface="Arial" pitchFamily="34"/>
+                <a:ea typeface="Arial Unicode MS" pitchFamily="2"/>
+                <a:cs typeface="Tahoma" pitchFamily="2"/>
+              </a:endParaRPr>
             </a:p>
           </p:txBody>
         </p:sp>
@@ -7592,249 +7520,6 @@
         </p:sp>
         <p:sp>
           <p:nvSpPr>
-            <p:cNvPr id="58" name="Rectangle 21"/>
-            <p:cNvSpPr/>
-            <p:nvPr/>
-          </p:nvSpPr>
-          <p:spPr bwMode="auto">
-            <a:xfrm>
-              <a:off x="695095" y="3163728"/>
-              <a:ext cx="3291728" cy="407787"/>
-            </a:xfrm>
-            <a:custGeom>
-              <a:avLst/>
-              <a:gdLst>
-                <a:gd name="f0" fmla="val 0"/>
-                <a:gd name="f1" fmla="val 21600"/>
-              </a:gdLst>
-              <a:ahLst/>
-              <a:cxnLst>
-                <a:cxn ang="3cd4">
-                  <a:pos x="hc" y="t"/>
-                </a:cxn>
-                <a:cxn ang="0">
-                  <a:pos x="r" y="vc"/>
-                </a:cxn>
-                <a:cxn ang="cd4">
-                  <a:pos x="hc" y="b"/>
-                </a:cxn>
-                <a:cxn ang="cd2">
-                  <a:pos x="l" y="vc"/>
-                </a:cxn>
-              </a:cxnLst>
-              <a:rect l="l" t="t" r="r" b="b"/>
-              <a:pathLst>
-                <a:path w="21600" h="21600">
-                  <a:moveTo>
-                    <a:pt x="f0" y="f0"/>
-                  </a:moveTo>
-                  <a:lnTo>
-                    <a:pt x="f1" y="f0"/>
-                  </a:lnTo>
-                  <a:lnTo>
-                    <a:pt x="f1" y="f1"/>
-                  </a:lnTo>
-                  <a:lnTo>
-                    <a:pt x="f0" y="f1"/>
-                  </a:lnTo>
-                  <a:lnTo>
-                    <a:pt x="f0" y="f0"/>
-                  </a:lnTo>
-                  <a:close/>
-                </a:path>
-              </a:pathLst>
-            </a:custGeom>
-            <a:solidFill>
-              <a:srgbClr val="376092"/>
-            </a:solidFill>
-            <a:ln w="9360">
-              <a:noFill/>
-              <a:prstDash val="solid"/>
-            </a:ln>
-          </p:spPr>
-          <p:txBody>
-            <a:bodyPr lIns="90000" tIns="45000" rIns="90000" bIns="45000" anchor="ctr" compatLnSpc="0"/>
-            <a:lstStyle>
-              <a:defPPr>
-                <a:defRPr lang="en-US"/>
-              </a:defPPr>
-              <a:lvl1pPr algn="l" rtl="0" fontAlgn="base">
-                <a:spcBef>
-                  <a:spcPct val="0"/>
-                </a:spcBef>
-                <a:spcAft>
-                  <a:spcPct val="0"/>
-                </a:spcAft>
-                <a:defRPr kern="1200">
-                  <a:solidFill>
-                    <a:schemeClr val="tx1"/>
-                  </a:solidFill>
-                  <a:latin typeface="Arial" pitchFamily="34" charset="0"/>
-                  <a:ea typeface="ＭＳ Ｐゴシック" pitchFamily="34" charset="-128"/>
-                  <a:cs typeface="+mn-cs"/>
-                </a:defRPr>
-              </a:lvl1pPr>
-              <a:lvl2pPr marL="457200" algn="l" rtl="0" fontAlgn="base">
-                <a:spcBef>
-                  <a:spcPct val="0"/>
-                </a:spcBef>
-                <a:spcAft>
-                  <a:spcPct val="0"/>
-                </a:spcAft>
-                <a:defRPr kern="1200">
-                  <a:solidFill>
-                    <a:schemeClr val="tx1"/>
-                  </a:solidFill>
-                  <a:latin typeface="Arial" pitchFamily="34" charset="0"/>
-                  <a:ea typeface="ＭＳ Ｐゴシック" pitchFamily="34" charset="-128"/>
-                  <a:cs typeface="+mn-cs"/>
-                </a:defRPr>
-              </a:lvl2pPr>
-              <a:lvl3pPr marL="914400" algn="l" rtl="0" fontAlgn="base">
-                <a:spcBef>
-                  <a:spcPct val="0"/>
-                </a:spcBef>
-                <a:spcAft>
-                  <a:spcPct val="0"/>
-                </a:spcAft>
-                <a:defRPr kern="1200">
-                  <a:solidFill>
-                    <a:schemeClr val="tx1"/>
-                  </a:solidFill>
-                  <a:latin typeface="Arial" pitchFamily="34" charset="0"/>
-                  <a:ea typeface="ＭＳ Ｐゴシック" pitchFamily="34" charset="-128"/>
-                  <a:cs typeface="+mn-cs"/>
-                </a:defRPr>
-              </a:lvl3pPr>
-              <a:lvl4pPr marL="1371600" algn="l" rtl="0" fontAlgn="base">
-                <a:spcBef>
-                  <a:spcPct val="0"/>
-                </a:spcBef>
-                <a:spcAft>
-                  <a:spcPct val="0"/>
-                </a:spcAft>
-                <a:defRPr kern="1200">
-                  <a:solidFill>
-                    <a:schemeClr val="tx1"/>
-                  </a:solidFill>
-                  <a:latin typeface="Arial" pitchFamily="34" charset="0"/>
-                  <a:ea typeface="ＭＳ Ｐゴシック" pitchFamily="34" charset="-128"/>
-                  <a:cs typeface="+mn-cs"/>
-                </a:defRPr>
-              </a:lvl4pPr>
-              <a:lvl5pPr marL="1828800" algn="l" rtl="0" fontAlgn="base">
-                <a:spcBef>
-                  <a:spcPct val="0"/>
-                </a:spcBef>
-                <a:spcAft>
-                  <a:spcPct val="0"/>
-                </a:spcAft>
-                <a:defRPr kern="1200">
-                  <a:solidFill>
-                    <a:schemeClr val="tx1"/>
-                  </a:solidFill>
-                  <a:latin typeface="Arial" pitchFamily="34" charset="0"/>
-                  <a:ea typeface="ＭＳ Ｐゴシック" pitchFamily="34" charset="-128"/>
-                  <a:cs typeface="+mn-cs"/>
-                </a:defRPr>
-              </a:lvl5pPr>
-              <a:lvl6pPr marL="2286000" algn="l" defTabSz="914400" rtl="0" eaLnBrk="1" latinLnBrk="0" hangingPunct="1">
-                <a:defRPr kern="1200">
-                  <a:solidFill>
-                    <a:schemeClr val="tx1"/>
-                  </a:solidFill>
-                  <a:latin typeface="Arial" pitchFamily="34" charset="0"/>
-                  <a:ea typeface="ＭＳ Ｐゴシック" pitchFamily="34" charset="-128"/>
-                  <a:cs typeface="+mn-cs"/>
-                </a:defRPr>
-              </a:lvl6pPr>
-              <a:lvl7pPr marL="2743200" algn="l" defTabSz="914400" rtl="0" eaLnBrk="1" latinLnBrk="0" hangingPunct="1">
-                <a:defRPr kern="1200">
-                  <a:solidFill>
-                    <a:schemeClr val="tx1"/>
-                  </a:solidFill>
-                  <a:latin typeface="Arial" pitchFamily="34" charset="0"/>
-                  <a:ea typeface="ＭＳ Ｐゴシック" pitchFamily="34" charset="-128"/>
-                  <a:cs typeface="+mn-cs"/>
-                </a:defRPr>
-              </a:lvl7pPr>
-              <a:lvl8pPr marL="3200400" algn="l" defTabSz="914400" rtl="0" eaLnBrk="1" latinLnBrk="0" hangingPunct="1">
-                <a:defRPr kern="1200">
-                  <a:solidFill>
-                    <a:schemeClr val="tx1"/>
-                  </a:solidFill>
-                  <a:latin typeface="Arial" pitchFamily="34" charset="0"/>
-                  <a:ea typeface="ＭＳ Ｐゴシック" pitchFamily="34" charset="-128"/>
-                  <a:cs typeface="+mn-cs"/>
-                </a:defRPr>
-              </a:lvl8pPr>
-              <a:lvl9pPr marL="3657600" algn="l" defTabSz="914400" rtl="0" eaLnBrk="1" latinLnBrk="0" hangingPunct="1">
-                <a:defRPr kern="1200">
-                  <a:solidFill>
-                    <a:schemeClr val="tx1"/>
-                  </a:solidFill>
-                  <a:latin typeface="Arial" pitchFamily="34" charset="0"/>
-                  <a:ea typeface="ＭＳ Ｐゴシック" pitchFamily="34" charset="-128"/>
-                  <a:cs typeface="+mn-cs"/>
-                </a:defRPr>
-              </a:lvl9pPr>
-            </a:lstStyle>
-            <a:p>
-              <a:pPr algn="ctr">
-                <a:spcBef>
-                  <a:spcPts val="0"/>
-                </a:spcBef>
-                <a:spcAft>
-                  <a:spcPts val="0"/>
-                </a:spcAft>
-                <a:defRPr/>
-              </a:pPr>
-              <a:r>
-                <a:rPr lang="en-US" sz="1200" dirty="0">
-                  <a:solidFill>
-                    <a:srgbClr val="FFFFFF"/>
-                  </a:solidFill>
-                  <a:latin typeface="Arial" pitchFamily="34"/>
-                  <a:ea typeface="Arial Unicode MS" pitchFamily="2"/>
-                  <a:cs typeface="Tahoma" pitchFamily="2"/>
-                </a:rPr>
-                <a:t>Hardware counter (PAPI, </a:t>
-              </a:r>
-              <a:r>
-                <a:rPr lang="en-US" sz="1200" dirty="0" err="1" smtClean="0">
-                  <a:solidFill>
-                    <a:srgbClr val="FFFFFF"/>
-                  </a:solidFill>
-                  <a:latin typeface="Arial" pitchFamily="34"/>
-                  <a:ea typeface="Arial Unicode MS" pitchFamily="2"/>
-                  <a:cs typeface="Tahoma" pitchFamily="2"/>
-                </a:rPr>
-                <a:t>rusage</a:t>
-              </a:r>
-              <a:r>
-                <a:rPr lang="en-US" sz="1200" dirty="0" smtClean="0">
-                  <a:solidFill>
-                    <a:srgbClr val="FFFFFF"/>
-                  </a:solidFill>
-                  <a:latin typeface="Arial" pitchFamily="34"/>
-                  <a:ea typeface="Arial Unicode MS" pitchFamily="2"/>
-                  <a:cs typeface="Tahoma" pitchFamily="2"/>
-                </a:rPr>
-                <a:t>, PERF, plugins)</a:t>
-              </a:r>
-              <a:endParaRPr lang="en-US" sz="1200" dirty="0">
-                <a:solidFill>
-                  <a:srgbClr val="FFFFFF"/>
-                </a:solidFill>
-                <a:latin typeface="Arial" pitchFamily="34"/>
-                <a:ea typeface="Arial Unicode MS" pitchFamily="2"/>
-                <a:cs typeface="Tahoma" pitchFamily="2"/>
-              </a:endParaRPr>
-            </a:p>
-          </p:txBody>
-        </p:sp>
-        <p:sp>
-          <p:nvSpPr>
             <p:cNvPr id="59" name="Up Arrow 35"/>
             <p:cNvSpPr/>
             <p:nvPr/>
@@ -9095,7 +8780,7 @@
           <p:spPr>
             <a:xfrm>
               <a:off x="645338" y="4314188"/>
-              <a:ext cx="7849120" cy="418951"/>
+              <a:ext cx="6216454" cy="418951"/>
             </a:xfrm>
             <a:custGeom>
               <a:avLst/>
@@ -9501,7 +9186,7 @@
                 <a:defRPr/>
               </a:pPr>
               <a:r>
-                <a:rPr lang="en-US" sz="1200" dirty="0">
+                <a:rPr lang="en-US" sz="1200" dirty="0" smtClean="0">
                   <a:solidFill>
                     <a:srgbClr val="FFFFFF"/>
                   </a:solidFill>
@@ -9509,8 +9194,60 @@
                   <a:ea typeface="Arial Unicode MS" pitchFamily="2"/>
                   <a:cs typeface="Tahoma" pitchFamily="2"/>
                 </a:rPr>
-                <a:t>Source code instrumentation</a:t>
+                <a:t>Source </a:t>
               </a:r>
+              <a:r>
+                <a:rPr lang="en-US" sz="1200" dirty="0">
+                  <a:solidFill>
+                    <a:srgbClr val="FFFFFF"/>
+                  </a:solidFill>
+                  <a:latin typeface="Arial" pitchFamily="34"/>
+                  <a:ea typeface="Arial Unicode MS" pitchFamily="2"/>
+                  <a:cs typeface="Tahoma" pitchFamily="2"/>
+                </a:rPr>
+                <a:t>code instrumentation</a:t>
+              </a:r>
+            </a:p>
+            <a:p>
+              <a:pPr algn="ctr">
+                <a:spcBef>
+                  <a:spcPts val="0"/>
+                </a:spcBef>
+                <a:spcAft>
+                  <a:spcPts val="0"/>
+                </a:spcAft>
+                <a:defRPr/>
+              </a:pPr>
+              <a:r>
+                <a:rPr lang="en-US" sz="1200" dirty="0">
+                  <a:solidFill>
+                    <a:srgbClr val="FFFFFF"/>
+                  </a:solidFill>
+                  <a:latin typeface="Arial" pitchFamily="34"/>
+                  <a:ea typeface="Arial Unicode MS" pitchFamily="2"/>
+                  <a:cs typeface="Tahoma" pitchFamily="2"/>
+                </a:rPr>
+                <a:t>(Compiler, PDT, User</a:t>
+              </a:r>
+              <a:r>
+                <a:rPr lang="en-US" sz="1200" dirty="0" smtClean="0">
+                  <a:solidFill>
+                    <a:srgbClr val="FFFFFF"/>
+                  </a:solidFill>
+                  <a:latin typeface="Arial" pitchFamily="34"/>
+                  <a:ea typeface="Arial Unicode MS" pitchFamily="2"/>
+                  <a:cs typeface="Tahoma" pitchFamily="2"/>
+                </a:rPr>
+                <a:t>)</a:t>
+              </a:r>
+              <a:endParaRPr lang="en-US" sz="1200" dirty="0">
+                <a:solidFill>
+                  <a:srgbClr val="FFFFFF"/>
+                </a:solidFill>
+                <a:latin typeface="Arial" pitchFamily="34"/>
+                <a:ea typeface="Arial Unicode MS" pitchFamily="2"/>
+                <a:cs typeface="Tahoma" pitchFamily="2"/>
+              </a:endParaRPr>
             </a:p>
           </p:txBody>
         </p:sp>
@@ -10600,6 +10337,253 @@
             </a:p>
           </p:txBody>
         </p:sp>
+        <p:sp>
+          <p:nvSpPr>
+            <p:cNvPr id="37" name="Rectangle 21"/>
+            <p:cNvSpPr/>
+            <p:nvPr/>
+          </p:nvSpPr>
+          <p:spPr bwMode="auto">
+            <a:xfrm>
+              <a:off x="503218" y="3175912"/>
+              <a:ext cx="2149129" cy="407787"/>
+            </a:xfrm>
+            <a:prstGeom prst="homePlate">
+              <a:avLst/>
+            </a:prstGeom>
+            <a:solidFill>
+              <a:srgbClr val="376092"/>
+            </a:solidFill>
+            <a:ln w="9360">
+              <a:noFill/>
+              <a:prstDash val="solid"/>
+            </a:ln>
+          </p:spPr>
+          <p:txBody>
+            <a:bodyPr lIns="90000" tIns="45000" rIns="90000" bIns="45000" anchor="ctr" compatLnSpc="0"/>
+            <a:lstStyle>
+              <a:defPPr>
+                <a:defRPr lang="en-US"/>
+              </a:defPPr>
+              <a:lvl1pPr algn="l" rtl="0" fontAlgn="base">
+                <a:spcBef>
+                  <a:spcPct val="0"/>
+                </a:spcBef>
+                <a:spcAft>
+                  <a:spcPct val="0"/>
+                </a:spcAft>
+                <a:defRPr kern="1200">
+                  <a:solidFill>
+                    <a:schemeClr val="tx1"/>
+                  </a:solidFill>
+                  <a:latin typeface="Arial" pitchFamily="34" charset="0"/>
+                  <a:ea typeface="ＭＳ Ｐゴシック" pitchFamily="34" charset="-128"/>
+                  <a:cs typeface="+mn-cs"/>
+                </a:defRPr>
+              </a:lvl1pPr>
+              <a:lvl2pPr marL="457200" algn="l" rtl="0" fontAlgn="base">
+                <a:spcBef>
+                  <a:spcPct val="0"/>
+                </a:spcBef>
+                <a:spcAft>
+                  <a:spcPct val="0"/>
+                </a:spcAft>
+                <a:defRPr kern="1200">
+                  <a:solidFill>
+                    <a:schemeClr val="tx1"/>
+                  </a:solidFill>
+                  <a:latin typeface="Arial" pitchFamily="34" charset="0"/>
+                  <a:ea typeface="ＭＳ Ｐゴシック" pitchFamily="34" charset="-128"/>
+                  <a:cs typeface="+mn-cs"/>
+                </a:defRPr>
+              </a:lvl2pPr>
+              <a:lvl3pPr marL="914400" algn="l" rtl="0" fontAlgn="base">
+                <a:spcBef>
+                  <a:spcPct val="0"/>
+                </a:spcBef>
+                <a:spcAft>
+                  <a:spcPct val="0"/>
+                </a:spcAft>
+                <a:defRPr kern="1200">
+                  <a:solidFill>
+                    <a:schemeClr val="tx1"/>
+                  </a:solidFill>
+                  <a:latin typeface="Arial" pitchFamily="34" charset="0"/>
+                  <a:ea typeface="ＭＳ Ｐゴシック" pitchFamily="34" charset="-128"/>
+                  <a:cs typeface="+mn-cs"/>
+                </a:defRPr>
+              </a:lvl3pPr>
+              <a:lvl4pPr marL="1371600" algn="l" rtl="0" fontAlgn="base">
+                <a:spcBef>
+                  <a:spcPct val="0"/>
+                </a:spcBef>
+                <a:spcAft>
+                  <a:spcPct val="0"/>
+                </a:spcAft>
+                <a:defRPr kern="1200">
+                  <a:solidFill>
+                    <a:schemeClr val="tx1"/>
+                  </a:solidFill>
+                  <a:latin typeface="Arial" pitchFamily="34" charset="0"/>
+                  <a:ea typeface="ＭＳ Ｐゴシック" pitchFamily="34" charset="-128"/>
+                  <a:cs typeface="+mn-cs"/>
+                </a:defRPr>
+              </a:lvl4pPr>
+              <a:lvl5pPr marL="1828800" algn="l" rtl="0" fontAlgn="base">
+                <a:spcBef>
+                  <a:spcPct val="0"/>
+                </a:spcBef>
+                <a:spcAft>
+                  <a:spcPct val="0"/>
+                </a:spcAft>
+                <a:defRPr kern="1200">
+                  <a:solidFill>
+                    <a:schemeClr val="tx1"/>
+                  </a:solidFill>
+                  <a:latin typeface="Arial" pitchFamily="34" charset="0"/>
+                  <a:ea typeface="ＭＳ Ｐゴシック" pitchFamily="34" charset="-128"/>
+                  <a:cs typeface="+mn-cs"/>
+                </a:defRPr>
+              </a:lvl5pPr>
+              <a:lvl6pPr marL="2286000" algn="l" defTabSz="914400" rtl="0" eaLnBrk="1" latinLnBrk="0" hangingPunct="1">
+                <a:defRPr kern="1200">
+                  <a:solidFill>
+                    <a:schemeClr val="tx1"/>
+                  </a:solidFill>
+                  <a:latin typeface="Arial" pitchFamily="34" charset="0"/>
+                  <a:ea typeface="ＭＳ Ｐゴシック" pitchFamily="34" charset="-128"/>
+                  <a:cs typeface="+mn-cs"/>
+                </a:defRPr>
+              </a:lvl6pPr>
+              <a:lvl7pPr marL="2743200" algn="l" defTabSz="914400" rtl="0" eaLnBrk="1" latinLnBrk="0" hangingPunct="1">
+                <a:defRPr kern="1200">
+                  <a:solidFill>
+                    <a:schemeClr val="tx1"/>
+                  </a:solidFill>
+                  <a:latin typeface="Arial" pitchFamily="34" charset="0"/>
+                  <a:ea typeface="ＭＳ Ｐゴシック" pitchFamily="34" charset="-128"/>
+                  <a:cs typeface="+mn-cs"/>
+                </a:defRPr>
+              </a:lvl7pPr>
+              <a:lvl8pPr marL="3200400" algn="l" defTabSz="914400" rtl="0" eaLnBrk="1" latinLnBrk="0" hangingPunct="1">
+                <a:defRPr kern="1200">
+                  <a:solidFill>
+                    <a:schemeClr val="tx1"/>
+                  </a:solidFill>
+                  <a:latin typeface="Arial" pitchFamily="34" charset="0"/>
+                  <a:ea typeface="ＭＳ Ｐゴシック" pitchFamily="34" charset="-128"/>
+                  <a:cs typeface="+mn-cs"/>
+                </a:defRPr>
+              </a:lvl8pPr>
+              <a:lvl9pPr marL="3657600" algn="l" defTabSz="914400" rtl="0" eaLnBrk="1" latinLnBrk="0" hangingPunct="1">
+                <a:defRPr kern="1200">
+                  <a:solidFill>
+                    <a:schemeClr val="tx1"/>
+                  </a:solidFill>
+                  <a:latin typeface="Arial" pitchFamily="34" charset="0"/>
+                  <a:ea typeface="ＭＳ Ｐゴシック" pitchFamily="34" charset="-128"/>
+                  <a:cs typeface="+mn-cs"/>
+                </a:defRPr>
+              </a:lvl9pPr>
+            </a:lstStyle>
+            <a:p>
+              <a:pPr algn="ctr">
+                <a:spcBef>
+                  <a:spcPts val="0"/>
+                </a:spcBef>
+                <a:spcAft>
+                  <a:spcPts val="0"/>
+                </a:spcAft>
+                <a:defRPr/>
+              </a:pPr>
+              <a:r>
+                <a:rPr lang="en-US" sz="1200" dirty="0">
+                  <a:solidFill>
+                    <a:srgbClr val="FFFFFF"/>
+                  </a:solidFill>
+                  <a:latin typeface="Arial" pitchFamily="34"/>
+                  <a:ea typeface="Arial Unicode MS" pitchFamily="2"/>
+                  <a:cs typeface="Tahoma" pitchFamily="2"/>
+                </a:rPr>
+                <a:t>Hardware </a:t>
+              </a:r>
+              <a:r>
+                <a:rPr lang="en-US" sz="1200" dirty="0" smtClean="0">
+                  <a:solidFill>
+                    <a:srgbClr val="FFFFFF"/>
+                  </a:solidFill>
+                  <a:latin typeface="Arial" pitchFamily="34"/>
+                  <a:ea typeface="Arial Unicode MS" pitchFamily="2"/>
+                  <a:cs typeface="Tahoma" pitchFamily="2"/>
+                </a:rPr>
+                <a:t>counter</a:t>
+              </a:r>
+            </a:p>
+            <a:p>
+              <a:pPr algn="ctr">
+                <a:spcBef>
+                  <a:spcPts val="0"/>
+                </a:spcBef>
+                <a:spcAft>
+                  <a:spcPts val="0"/>
+                </a:spcAft>
+                <a:defRPr/>
+              </a:pPr>
+              <a:r>
+                <a:rPr lang="en-US" sz="1200" dirty="0" smtClean="0">
+                  <a:solidFill>
+                    <a:srgbClr val="FFFFFF"/>
+                  </a:solidFill>
+                  <a:latin typeface="Arial" pitchFamily="34"/>
+                  <a:ea typeface="Arial Unicode MS" pitchFamily="2"/>
+                  <a:cs typeface="Tahoma" pitchFamily="2"/>
+                </a:rPr>
+                <a:t>(PAPI</a:t>
+              </a:r>
+              <a:r>
+                <a:rPr lang="en-US" sz="1200" dirty="0">
+                  <a:solidFill>
+                    <a:srgbClr val="FFFFFF"/>
+                  </a:solidFill>
+                  <a:latin typeface="Arial" pitchFamily="34"/>
+                  <a:ea typeface="Arial Unicode MS" pitchFamily="2"/>
+                  <a:cs typeface="Tahoma" pitchFamily="2"/>
+                </a:rPr>
+                <a:t>, </a:t>
+              </a:r>
+              <a:r>
+                <a:rPr lang="en-US" sz="1200" dirty="0" err="1" smtClean="0">
+                  <a:solidFill>
+                    <a:srgbClr val="FFFFFF"/>
+                  </a:solidFill>
+                  <a:latin typeface="Arial" pitchFamily="34"/>
+                  <a:ea typeface="Arial Unicode MS" pitchFamily="2"/>
+                  <a:cs typeface="Tahoma" pitchFamily="2"/>
+                </a:rPr>
+                <a:t>rusage</a:t>
+              </a:r>
+              <a:r>
+                <a:rPr lang="en-US" sz="1200" dirty="0" smtClean="0">
+                  <a:solidFill>
+                    <a:srgbClr val="FFFFFF"/>
+                  </a:solidFill>
+                  <a:latin typeface="Arial" pitchFamily="34"/>
+                  <a:ea typeface="Arial Unicode MS" pitchFamily="2"/>
+                  <a:cs typeface="Tahoma" pitchFamily="2"/>
+                </a:rPr>
+                <a:t>, PERF, plugins)</a:t>
+              </a:r>
+              <a:endParaRPr lang="en-US" sz="1200" dirty="0">
+                <a:solidFill>
+                  <a:srgbClr val="FFFFFF"/>
+                </a:solidFill>
+                <a:latin typeface="Arial" pitchFamily="34"/>
+                <a:ea typeface="Arial Unicode MS" pitchFamily="2"/>
+                <a:cs typeface="Tahoma" pitchFamily="2"/>
+              </a:endParaRPr>
+            </a:p>
+          </p:txBody>
+        </p:sp>
       </p:grpSp>
     </p:spTree>
     <p:extLst>
@@ -10657,7 +10641,7 @@
     </a:clrScheme>
     <a:fontScheme name="Office Theme">
       <a:majorFont>
-        <a:latin typeface="Calibri Light" panose="020F0302020204030204"/>
+        <a:latin typeface="Calibri Light"/>
         <a:ea typeface=""/>
         <a:cs typeface=""/>
         <a:font script="Jpan" typeface="ＭＳ Ｐゴシック"/>
@@ -10692,7 +10676,7 @@
         <a:font script="Geor" typeface="Sylfaen"/>
       </a:majorFont>
       <a:minorFont>
-        <a:latin typeface="Calibri" panose="020F0502020204030204"/>
+        <a:latin typeface="Calibri"/>
         <a:ea typeface=""/>
         <a:cs typeface=""/>
         <a:font script="Jpan" typeface="ＭＳ Ｐゴシック"/>
@@ -10869,7 +10853,7 @@
   <a:extraClrSchemeLst/>
   <a:extLst>
     <a:ext uri="{05A4C25C-085E-4340-85A3-A5531E510DB2}">
-      <thm15:themeFamily xmlns:thm15="http://schemas.microsoft.com/office/thememl/2012/main" xmlns="" name="Office Theme" id="{62F939B6-93AF-4DB8-9C6B-D6C7DFDC589F}" vid="{4A3C46E8-61CC-4603-A589-7422A47A8E4A}"/>
+      <thm15:themeFamily xmlns="" xmlns:thm15="http://schemas.microsoft.com/office/thememl/2012/main" name="Office Theme" id="{62F939B6-93AF-4DB8-9C6B-D6C7DFDC589F}" vid="{4A3C46E8-61CC-4603-A589-7422A47A8E4A}"/>
     </a:ext>
   </a:extLst>
 </a:theme>

</xml_diff>

<commit_message>
doc: For consistency, spell '''interrupts''' in all lower case.
Subversion: revision:10256
</commit_message>
<xml_diff>
--- a/doc/images/score-p-overview.pptx
+++ b/doc/images/score-p-overview.pptx
@@ -106,7 +106,7 @@
   </p:defaultTextStyle>
   <p:extLst>
     <p:ext uri="{EFAFB233-063F-42B5-8137-9DF3F51BA10A}">
-      <p15:sldGuideLst xmlns="" xmlns:p15="http://schemas.microsoft.com/office/powerpoint/2012/main"/>
+      <p15:sldGuideLst xmlns:p15="http://schemas.microsoft.com/office/powerpoint/2012/main" xmlns=""/>
     </p:ext>
   </p:extLst>
 </p:presentation>
@@ -243,7 +243,7 @@
           <a:p>
             <a:fld id="{B805A886-7B5C-4891-93D1-29873BD06F24}" type="datetimeFigureOut">
               <a:rPr lang="de-DE" smtClean="0"/>
-              <a:t>10.12.2015</a:t>
+              <a:t>11.04.2016</a:t>
             </a:fld>
             <a:endParaRPr lang="de-DE"/>
           </a:p>
@@ -413,7 +413,7 @@
           <a:p>
             <a:fld id="{B805A886-7B5C-4891-93D1-29873BD06F24}" type="datetimeFigureOut">
               <a:rPr lang="de-DE" smtClean="0"/>
-              <a:t>10.12.2015</a:t>
+              <a:t>11.04.2016</a:t>
             </a:fld>
             <a:endParaRPr lang="de-DE"/>
           </a:p>
@@ -593,7 +593,7 @@
           <a:p>
             <a:fld id="{B805A886-7B5C-4891-93D1-29873BD06F24}" type="datetimeFigureOut">
               <a:rPr lang="de-DE" smtClean="0"/>
-              <a:t>10.12.2015</a:t>
+              <a:t>11.04.2016</a:t>
             </a:fld>
             <a:endParaRPr lang="de-DE"/>
           </a:p>
@@ -763,7 +763,7 @@
           <a:p>
             <a:fld id="{B805A886-7B5C-4891-93D1-29873BD06F24}" type="datetimeFigureOut">
               <a:rPr lang="de-DE" smtClean="0"/>
-              <a:t>10.12.2015</a:t>
+              <a:t>11.04.2016</a:t>
             </a:fld>
             <a:endParaRPr lang="de-DE"/>
           </a:p>
@@ -1007,7 +1007,7 @@
           <a:p>
             <a:fld id="{B805A886-7B5C-4891-93D1-29873BD06F24}" type="datetimeFigureOut">
               <a:rPr lang="de-DE" smtClean="0"/>
-              <a:t>10.12.2015</a:t>
+              <a:t>11.04.2016</a:t>
             </a:fld>
             <a:endParaRPr lang="de-DE"/>
           </a:p>
@@ -1239,7 +1239,7 @@
           <a:p>
             <a:fld id="{B805A886-7B5C-4891-93D1-29873BD06F24}" type="datetimeFigureOut">
               <a:rPr lang="de-DE" smtClean="0"/>
-              <a:t>10.12.2015</a:t>
+              <a:t>11.04.2016</a:t>
             </a:fld>
             <a:endParaRPr lang="de-DE"/>
           </a:p>
@@ -1606,7 +1606,7 @@
           <a:p>
             <a:fld id="{B805A886-7B5C-4891-93D1-29873BD06F24}" type="datetimeFigureOut">
               <a:rPr lang="de-DE" smtClean="0"/>
-              <a:t>10.12.2015</a:t>
+              <a:t>11.04.2016</a:t>
             </a:fld>
             <a:endParaRPr lang="de-DE"/>
           </a:p>
@@ -1724,7 +1724,7 @@
           <a:p>
             <a:fld id="{B805A886-7B5C-4891-93D1-29873BD06F24}" type="datetimeFigureOut">
               <a:rPr lang="de-DE" smtClean="0"/>
-              <a:t>10.12.2015</a:t>
+              <a:t>11.04.2016</a:t>
             </a:fld>
             <a:endParaRPr lang="de-DE"/>
           </a:p>
@@ -1819,7 +1819,7 @@
           <a:p>
             <a:fld id="{B805A886-7B5C-4891-93D1-29873BD06F24}" type="datetimeFigureOut">
               <a:rPr lang="de-DE" smtClean="0"/>
-              <a:t>10.12.2015</a:t>
+              <a:t>11.04.2016</a:t>
             </a:fld>
             <a:endParaRPr lang="de-DE"/>
           </a:p>
@@ -2096,7 +2096,7 @@
           <a:p>
             <a:fld id="{B805A886-7B5C-4891-93D1-29873BD06F24}" type="datetimeFigureOut">
               <a:rPr lang="de-DE" smtClean="0"/>
-              <a:t>10.12.2015</a:t>
+              <a:t>11.04.2016</a:t>
             </a:fld>
             <a:endParaRPr lang="de-DE"/>
           </a:p>
@@ -2353,7 +2353,7 @@
           <a:p>
             <a:fld id="{B805A886-7B5C-4891-93D1-29873BD06F24}" type="datetimeFigureOut">
               <a:rPr lang="de-DE" smtClean="0"/>
-              <a:t>10.12.2015</a:t>
+              <a:t>11.04.2016</a:t>
             </a:fld>
             <a:endParaRPr lang="de-DE"/>
           </a:p>
@@ -2566,7 +2566,7 @@
           <a:p>
             <a:fld id="{B805A886-7B5C-4891-93D1-29873BD06F24}" type="datetimeFigureOut">
               <a:rPr lang="de-DE" smtClean="0"/>
-              <a:t>10.12.2015</a:t>
+              <a:t>11.04.2016</a:t>
             </a:fld>
             <a:endParaRPr lang="de-DE"/>
           </a:p>
@@ -6300,7 +6300,7 @@
                 <a:defRPr/>
               </a:pPr>
               <a:r>
-                <a:rPr lang="en-US" sz="1200" dirty="0">
+                <a:rPr lang="en-US" sz="1200" dirty="0" smtClean="0">
                   <a:solidFill>
                     <a:srgbClr val="FFFFFF"/>
                   </a:solidFill>
@@ -6308,29 +6308,7 @@
                   <a:ea typeface="Arial Unicode MS" pitchFamily="2"/>
                   <a:cs typeface="Tahoma" pitchFamily="2"/>
                 </a:rPr>
-                <a:t>Interrupts</a:t>
-              </a:r>
-            </a:p>
-            <a:p>
-              <a:pPr algn="ctr">
-                <a:spcBef>
-                  <a:spcPts val="0"/>
-                </a:spcBef>
-                <a:spcAft>
-                  <a:spcPts val="0"/>
-                </a:spcAft>
-                <a:defRPr/>
-              </a:pPr>
-              <a:r>
-                <a:rPr lang="en-US" sz="1200" dirty="0">
-                  <a:solidFill>
-                    <a:srgbClr val="FFFFFF"/>
-                  </a:solidFill>
-                  <a:latin typeface="Arial" pitchFamily="34"/>
-                  <a:ea typeface="Arial Unicode MS" pitchFamily="2"/>
-                  <a:cs typeface="Tahoma" pitchFamily="2"/>
-                </a:rPr>
-                <a:t>(PAPI, PERF)</a:t>
+                <a:t>interrupts</a:t>
               </a:r>
               <a:endParaRPr lang="en-US" sz="1200" dirty="0">
                 <a:solidFill>
@@ -6340,6 +6318,28 @@
                 <a:ea typeface="Arial Unicode MS" pitchFamily="2"/>
                 <a:cs typeface="Tahoma" pitchFamily="2"/>
               </a:endParaRPr>
+            </a:p>
+            <a:p>
+              <a:pPr algn="ctr">
+                <a:spcBef>
+                  <a:spcPts val="0"/>
+                </a:spcBef>
+                <a:spcAft>
+                  <a:spcPts val="0"/>
+                </a:spcAft>
+                <a:defRPr/>
+              </a:pPr>
+              <a:r>
+                <a:rPr lang="en-US" sz="1200" dirty="0">
+                  <a:solidFill>
+                    <a:srgbClr val="FFFFFF"/>
+                  </a:solidFill>
+                  <a:latin typeface="Arial" pitchFamily="34"/>
+                  <a:ea typeface="Arial Unicode MS" pitchFamily="2"/>
+                  <a:cs typeface="Tahoma" pitchFamily="2"/>
+                </a:rPr>
+                <a:t>(PAPI, PERF)</a:t>
+              </a:r>
             </a:p>
           </p:txBody>
         </p:sp>
@@ -10853,7 +10853,7 @@
   <a:extraClrSchemeLst/>
   <a:extLst>
     <a:ext uri="{05A4C25C-085E-4340-85A3-A5531E510DB2}">
-      <thm15:themeFamily xmlns="" xmlns:thm15="http://schemas.microsoft.com/office/thememl/2012/main" name="Office Theme" id="{62F939B6-93AF-4DB8-9C6B-D6C7DFDC589F}" vid="{4A3C46E8-61CC-4603-A589-7422A47A8E4A}"/>
+      <thm15:themeFamily xmlns:thm15="http://schemas.microsoft.com/office/thememl/2012/main" xmlns="" name="Office Theme" id="{62F939B6-93AF-4DB8-9C6B-D6C7DFDC589F}" vid="{4A3C46E8-61CC-4603-A589-7422A47A8E4A}"/>
     </a:ext>
   </a:extLst>
 </a:theme>

</xml_diff>

<commit_message>
Add OpenACC to Score-P overview figure
Subversion: revision:10597
</commit_message>
<xml_diff>
--- a/doc/images/score-p-overview.pptx
+++ b/doc/images/score-p-overview.pptx
@@ -106,7 +106,18 @@
   </p:defaultTextStyle>
   <p:extLst>
     <p:ext uri="{EFAFB233-063F-42B5-8137-9DF3F51BA10A}">
-      <p15:sldGuideLst xmlns:p15="http://schemas.microsoft.com/office/powerpoint/2012/main" xmlns=""/>
+      <p15:sldGuideLst xmlns:p15="http://schemas.microsoft.com/office/powerpoint/2012/main">
+        <p15:guide id="1" orient="horz" pos="2160">
+          <p15:clr>
+            <a:srgbClr val="A4A3A4"/>
+          </p15:clr>
+        </p15:guide>
+        <p15:guide id="2" pos="2880">
+          <p15:clr>
+            <a:srgbClr val="A4A3A4"/>
+          </p15:clr>
+        </p15:guide>
+      </p15:sldGuideLst>
     </p:ext>
   </p:extLst>
 </p:presentation>
@@ -243,7 +254,7 @@
           <a:p>
             <a:fld id="{B805A886-7B5C-4891-93D1-29873BD06F24}" type="datetimeFigureOut">
               <a:rPr lang="de-DE" smtClean="0"/>
-              <a:t>11.04.2016</a:t>
+              <a:t>23.05.2016</a:t>
             </a:fld>
             <a:endParaRPr lang="de-DE"/>
           </a:p>
@@ -413,7 +424,7 @@
           <a:p>
             <a:fld id="{B805A886-7B5C-4891-93D1-29873BD06F24}" type="datetimeFigureOut">
               <a:rPr lang="de-DE" smtClean="0"/>
-              <a:t>11.04.2016</a:t>
+              <a:t>23.05.2016</a:t>
             </a:fld>
             <a:endParaRPr lang="de-DE"/>
           </a:p>
@@ -593,7 +604,7 @@
           <a:p>
             <a:fld id="{B805A886-7B5C-4891-93D1-29873BD06F24}" type="datetimeFigureOut">
               <a:rPr lang="de-DE" smtClean="0"/>
-              <a:t>11.04.2016</a:t>
+              <a:t>23.05.2016</a:t>
             </a:fld>
             <a:endParaRPr lang="de-DE"/>
           </a:p>
@@ -763,7 +774,7 @@
           <a:p>
             <a:fld id="{B805A886-7B5C-4891-93D1-29873BD06F24}" type="datetimeFigureOut">
               <a:rPr lang="de-DE" smtClean="0"/>
-              <a:t>11.04.2016</a:t>
+              <a:t>23.05.2016</a:t>
             </a:fld>
             <a:endParaRPr lang="de-DE"/>
           </a:p>
@@ -1007,7 +1018,7 @@
           <a:p>
             <a:fld id="{B805A886-7B5C-4891-93D1-29873BD06F24}" type="datetimeFigureOut">
               <a:rPr lang="de-DE" smtClean="0"/>
-              <a:t>11.04.2016</a:t>
+              <a:t>23.05.2016</a:t>
             </a:fld>
             <a:endParaRPr lang="de-DE"/>
           </a:p>
@@ -1239,7 +1250,7 @@
           <a:p>
             <a:fld id="{B805A886-7B5C-4891-93D1-29873BD06F24}" type="datetimeFigureOut">
               <a:rPr lang="de-DE" smtClean="0"/>
-              <a:t>11.04.2016</a:t>
+              <a:t>23.05.2016</a:t>
             </a:fld>
             <a:endParaRPr lang="de-DE"/>
           </a:p>
@@ -1606,7 +1617,7 @@
           <a:p>
             <a:fld id="{B805A886-7B5C-4891-93D1-29873BD06F24}" type="datetimeFigureOut">
               <a:rPr lang="de-DE" smtClean="0"/>
-              <a:t>11.04.2016</a:t>
+              <a:t>23.05.2016</a:t>
             </a:fld>
             <a:endParaRPr lang="de-DE"/>
           </a:p>
@@ -1724,7 +1735,7 @@
           <a:p>
             <a:fld id="{B805A886-7B5C-4891-93D1-29873BD06F24}" type="datetimeFigureOut">
               <a:rPr lang="de-DE" smtClean="0"/>
-              <a:t>11.04.2016</a:t>
+              <a:t>23.05.2016</a:t>
             </a:fld>
             <a:endParaRPr lang="de-DE"/>
           </a:p>
@@ -1819,7 +1830,7 @@
           <a:p>
             <a:fld id="{B805A886-7B5C-4891-93D1-29873BD06F24}" type="datetimeFigureOut">
               <a:rPr lang="de-DE" smtClean="0"/>
-              <a:t>11.04.2016</a:t>
+              <a:t>23.05.2016</a:t>
             </a:fld>
             <a:endParaRPr lang="de-DE"/>
           </a:p>
@@ -2096,7 +2107,7 @@
           <a:p>
             <a:fld id="{B805A886-7B5C-4891-93D1-29873BD06F24}" type="datetimeFigureOut">
               <a:rPr lang="de-DE" smtClean="0"/>
-              <a:t>11.04.2016</a:t>
+              <a:t>23.05.2016</a:t>
             </a:fld>
             <a:endParaRPr lang="de-DE"/>
           </a:p>
@@ -2353,7 +2364,7 @@
           <a:p>
             <a:fld id="{B805A886-7B5C-4891-93D1-29873BD06F24}" type="datetimeFigureOut">
               <a:rPr lang="de-DE" smtClean="0"/>
-              <a:t>11.04.2016</a:t>
+              <a:t>23.05.2016</a:t>
             </a:fld>
             <a:endParaRPr lang="de-DE"/>
           </a:p>
@@ -2566,7 +2577,7 @@
           <a:p>
             <a:fld id="{B805A886-7B5C-4891-93D1-29873BD06F24}" type="datetimeFigureOut">
               <a:rPr lang="de-DE" smtClean="0"/>
-              <a:t>11.04.2016</a:t>
+              <a:t>23.05.2016</a:t>
             </a:fld>
             <a:endParaRPr lang="de-DE"/>
           </a:p>
@@ -5523,8 +5534,8 @@
           </p:nvSpPr>
           <p:spPr bwMode="auto">
             <a:xfrm>
-              <a:off x="3794946" y="4990718"/>
-              <a:ext cx="1566000" cy="648000"/>
+              <a:off x="3794946" y="4990717"/>
+              <a:ext cx="1566000" cy="733090"/>
             </a:xfrm>
             <a:custGeom>
               <a:avLst/>
@@ -5755,7 +5766,51 @@
                   <a:ea typeface="Arial Unicode MS" pitchFamily="2"/>
                   <a:cs typeface="Tahoma" pitchFamily="2"/>
                 </a:rPr>
-                <a:t>CUDA, OpenCL)</a:t>
+                <a:t>CUDA, </a:t>
+              </a:r>
+              <a:r>
+                <a:rPr lang="en-US" sz="1200" dirty="0" err="1" smtClean="0">
+                  <a:solidFill>
+                    <a:srgbClr val="FFFFFF"/>
+                  </a:solidFill>
+                  <a:latin typeface="Arial" pitchFamily="34"/>
+                  <a:ea typeface="Arial Unicode MS" pitchFamily="2"/>
+                  <a:cs typeface="Tahoma" pitchFamily="2"/>
+                </a:rPr>
+                <a:t>OpenCL</a:t>
+              </a:r>
+              <a:r>
+                <a:rPr lang="en-US" sz="1200" dirty="0" smtClean="0">
+                  <a:solidFill>
+                    <a:srgbClr val="FFFFFF"/>
+                  </a:solidFill>
+                  <a:latin typeface="Arial" pitchFamily="34"/>
+                  <a:ea typeface="Arial Unicode MS" pitchFamily="2"/>
+                  <a:cs typeface="Tahoma" pitchFamily="2"/>
+                </a:rPr>
+                <a:t>, </a:t>
+              </a:r>
+              <a:r>
+                <a:rPr lang="en-US" sz="1200" dirty="0" err="1" smtClean="0">
+                  <a:solidFill>
+                    <a:srgbClr val="FFFFFF"/>
+                  </a:solidFill>
+                  <a:latin typeface="Arial" pitchFamily="34"/>
+                  <a:ea typeface="Arial Unicode MS" pitchFamily="2"/>
+                  <a:cs typeface="Tahoma" pitchFamily="2"/>
+                </a:rPr>
+                <a:t>OpenACC</a:t>
+              </a:r>
+              <a:r>
+                <a:rPr lang="en-US" sz="1200" dirty="0" smtClean="0">
+                  <a:solidFill>
+                    <a:srgbClr val="FFFFFF"/>
+                  </a:solidFill>
+                  <a:latin typeface="Arial" pitchFamily="34"/>
+                  <a:ea typeface="Arial Unicode MS" pitchFamily="2"/>
+                  <a:cs typeface="Tahoma" pitchFamily="2"/>
+                </a:rPr>
+                <a:t>)</a:t>
               </a:r>
               <a:endParaRPr lang="en-US" sz="1200" dirty="0">
                 <a:solidFill>
@@ -6210,8 +6265,8 @@
           </p:nvSpPr>
           <p:spPr bwMode="auto">
             <a:xfrm>
-              <a:off x="7053889" y="4990718"/>
-              <a:ext cx="1566000" cy="648000"/>
+              <a:off x="7053889" y="4990717"/>
+              <a:ext cx="1566000" cy="733090"/>
             </a:xfrm>
             <a:custGeom>
               <a:avLst/>
@@ -8020,8 +8075,8 @@
           </p:nvSpPr>
           <p:spPr bwMode="auto">
             <a:xfrm>
-              <a:off x="533660" y="4990718"/>
-              <a:ext cx="1566000" cy="648000"/>
+              <a:off x="533660" y="4990717"/>
+              <a:ext cx="1566000" cy="733090"/>
             </a:xfrm>
             <a:custGeom>
               <a:avLst/>
@@ -8501,8 +8556,8 @@
           </p:nvSpPr>
           <p:spPr bwMode="auto">
             <a:xfrm>
-              <a:off x="2164303" y="4990718"/>
-              <a:ext cx="1566000" cy="648000"/>
+              <a:off x="2164303" y="4990717"/>
+              <a:ext cx="1566000" cy="733090"/>
             </a:xfrm>
             <a:custGeom>
               <a:avLst/>
@@ -8994,8 +9049,8 @@
           </p:nvSpPr>
           <p:spPr bwMode="auto">
             <a:xfrm>
-              <a:off x="5423250" y="4990718"/>
-              <a:ext cx="1566000" cy="648000"/>
+              <a:off x="5423250" y="4990717"/>
+              <a:ext cx="1566000" cy="733090"/>
             </a:xfrm>
             <a:custGeom>
               <a:avLst/>
@@ -10853,7 +10908,7 @@
   <a:extraClrSchemeLst/>
   <a:extLst>
     <a:ext uri="{05A4C25C-085E-4340-85A3-A5531E510DB2}">
-      <thm15:themeFamily xmlns:thm15="http://schemas.microsoft.com/office/thememl/2012/main" xmlns="" name="Office Theme" id="{62F939B6-93AF-4DB8-9C6B-D6C7DFDC589F}" vid="{4A3C46E8-61CC-4603-A589-7422A47A8E4A}"/>
+      <thm15:themeFamily xmlns:thm15="http://schemas.microsoft.com/office/thememl/2012/main" name="Office Theme" id="{62F939B6-93AF-4DB8-9C6B-D6C7DFDC589F}" vid="{4A3C46E8-61CC-4603-A589-7422A47A8E4A}"/>
     </a:ext>
   </a:extLst>
 </a:theme>

</xml_diff>

<commit_message>
Insert I/O recording to Score-P architecture overview
Subversion: revision:14630
</commit_message>
<xml_diff>
--- a/doc/images/score-p-overview.pptx
+++ b/doc/images/score-p-overview.pptx
@@ -254,7 +254,7 @@
           <a:p>
             <a:fld id="{B805A886-7B5C-4891-93D1-29873BD06F24}" type="datetimeFigureOut">
               <a:rPr lang="de-DE" smtClean="0"/>
-              <a:t>23.05.2016</a:t>
+              <a:t>17.07.2019</a:t>
             </a:fld>
             <a:endParaRPr lang="de-DE"/>
           </a:p>
@@ -424,7 +424,7 @@
           <a:p>
             <a:fld id="{B805A886-7B5C-4891-93D1-29873BD06F24}" type="datetimeFigureOut">
               <a:rPr lang="de-DE" smtClean="0"/>
-              <a:t>23.05.2016</a:t>
+              <a:t>17.07.2019</a:t>
             </a:fld>
             <a:endParaRPr lang="de-DE"/>
           </a:p>
@@ -604,7 +604,7 @@
           <a:p>
             <a:fld id="{B805A886-7B5C-4891-93D1-29873BD06F24}" type="datetimeFigureOut">
               <a:rPr lang="de-DE" smtClean="0"/>
-              <a:t>23.05.2016</a:t>
+              <a:t>17.07.2019</a:t>
             </a:fld>
             <a:endParaRPr lang="de-DE"/>
           </a:p>
@@ -774,7 +774,7 @@
           <a:p>
             <a:fld id="{B805A886-7B5C-4891-93D1-29873BD06F24}" type="datetimeFigureOut">
               <a:rPr lang="de-DE" smtClean="0"/>
-              <a:t>23.05.2016</a:t>
+              <a:t>17.07.2019</a:t>
             </a:fld>
             <a:endParaRPr lang="de-DE"/>
           </a:p>
@@ -1018,7 +1018,7 @@
           <a:p>
             <a:fld id="{B805A886-7B5C-4891-93D1-29873BD06F24}" type="datetimeFigureOut">
               <a:rPr lang="de-DE" smtClean="0"/>
-              <a:t>23.05.2016</a:t>
+              <a:t>17.07.2019</a:t>
             </a:fld>
             <a:endParaRPr lang="de-DE"/>
           </a:p>
@@ -1250,7 +1250,7 @@
           <a:p>
             <a:fld id="{B805A886-7B5C-4891-93D1-29873BD06F24}" type="datetimeFigureOut">
               <a:rPr lang="de-DE" smtClean="0"/>
-              <a:t>23.05.2016</a:t>
+              <a:t>17.07.2019</a:t>
             </a:fld>
             <a:endParaRPr lang="de-DE"/>
           </a:p>
@@ -1617,7 +1617,7 @@
           <a:p>
             <a:fld id="{B805A886-7B5C-4891-93D1-29873BD06F24}" type="datetimeFigureOut">
               <a:rPr lang="de-DE" smtClean="0"/>
-              <a:t>23.05.2016</a:t>
+              <a:t>17.07.2019</a:t>
             </a:fld>
             <a:endParaRPr lang="de-DE"/>
           </a:p>
@@ -1735,7 +1735,7 @@
           <a:p>
             <a:fld id="{B805A886-7B5C-4891-93D1-29873BD06F24}" type="datetimeFigureOut">
               <a:rPr lang="de-DE" smtClean="0"/>
-              <a:t>23.05.2016</a:t>
+              <a:t>17.07.2019</a:t>
             </a:fld>
             <a:endParaRPr lang="de-DE"/>
           </a:p>
@@ -1830,7 +1830,7 @@
           <a:p>
             <a:fld id="{B805A886-7B5C-4891-93D1-29873BD06F24}" type="datetimeFigureOut">
               <a:rPr lang="de-DE" smtClean="0"/>
-              <a:t>23.05.2016</a:t>
+              <a:t>17.07.2019</a:t>
             </a:fld>
             <a:endParaRPr lang="de-DE"/>
           </a:p>
@@ -2107,7 +2107,7 @@
           <a:p>
             <a:fld id="{B805A886-7B5C-4891-93D1-29873BD06F24}" type="datetimeFigureOut">
               <a:rPr lang="de-DE" smtClean="0"/>
-              <a:t>23.05.2016</a:t>
+              <a:t>17.07.2019</a:t>
             </a:fld>
             <a:endParaRPr lang="de-DE"/>
           </a:p>
@@ -2364,7 +2364,7 @@
           <a:p>
             <a:fld id="{B805A886-7B5C-4891-93D1-29873BD06F24}" type="datetimeFigureOut">
               <a:rPr lang="de-DE" smtClean="0"/>
-              <a:t>23.05.2016</a:t>
+              <a:t>17.07.2019</a:t>
             </a:fld>
             <a:endParaRPr lang="de-DE"/>
           </a:p>
@@ -2577,7 +2577,7 @@
           <a:p>
             <a:fld id="{B805A886-7B5C-4891-93D1-29873BD06F24}" type="datetimeFigureOut">
               <a:rPr lang="de-DE" smtClean="0"/>
-              <a:t>23.05.2016</a:t>
+              <a:t>17.07.2019</a:t>
             </a:fld>
             <a:endParaRPr lang="de-DE"/>
           </a:p>
@@ -2984,7 +2984,7 @@
       </p:grpSpPr>
       <p:grpSp>
         <p:nvGrpSpPr>
-          <p:cNvPr id="72" name="Gruppieren 71"/>
+          <p:cNvPr id="3" name="Gruppieren 2"/>
           <p:cNvGrpSpPr/>
           <p:nvPr/>
         </p:nvGrpSpPr>
@@ -2992,8 +2992,8 @@
           <a:xfrm>
             <a:off x="78314" y="592667"/>
             <a:ext cx="8987376" cy="5672666"/>
-            <a:chOff x="428906" y="813954"/>
-            <a:chExt cx="8286192" cy="5230092"/>
+            <a:chOff x="78314" y="592667"/>
+            <a:chExt cx="8987376" cy="5672666"/>
           </a:xfrm>
         </p:grpSpPr>
         <p:sp>
@@ -3004,8 +3004,8 @@
           </p:nvSpPr>
           <p:spPr>
             <a:xfrm>
-              <a:off x="428908" y="2864706"/>
-              <a:ext cx="8281987" cy="3179340"/>
+              <a:off x="78316" y="2816955"/>
+              <a:ext cx="8982815" cy="3448378"/>
             </a:xfrm>
             <a:custGeom>
               <a:avLst/>
@@ -3216,8 +3216,8 @@
           </p:nvSpPr>
           <p:spPr>
             <a:xfrm>
-              <a:off x="428908" y="827943"/>
-              <a:ext cx="1242793" cy="533400"/>
+              <a:off x="78316" y="607840"/>
+              <a:ext cx="1347959" cy="578537"/>
             </a:xfrm>
             <a:custGeom>
               <a:avLst/>
@@ -3437,8 +3437,8 @@
           </p:nvSpPr>
           <p:spPr>
             <a:xfrm>
-              <a:off x="1836489" y="827943"/>
-              <a:ext cx="1243891" cy="533400"/>
+              <a:off x="1605008" y="607840"/>
+              <a:ext cx="1349150" cy="578537"/>
             </a:xfrm>
             <a:custGeom>
               <a:avLst/>
@@ -3658,8 +3658,8 @@
           </p:nvSpPr>
           <p:spPr>
             <a:xfrm>
-              <a:off x="7471207" y="827943"/>
-              <a:ext cx="1243891" cy="533400"/>
+              <a:off x="7716540" y="607840"/>
+              <a:ext cx="1349150" cy="578537"/>
             </a:xfrm>
             <a:custGeom>
               <a:avLst/>
@@ -3871,8 +3871,8 @@
           </p:nvSpPr>
           <p:spPr>
             <a:xfrm>
-              <a:off x="4653847" y="827943"/>
-              <a:ext cx="1243891" cy="533400"/>
+              <a:off x="4660773" y="607840"/>
+              <a:ext cx="1349150" cy="578537"/>
             </a:xfrm>
             <a:custGeom>
               <a:avLst/>
@@ -4084,8 +4084,8 @@
           </p:nvSpPr>
           <p:spPr>
             <a:xfrm>
-              <a:off x="895522" y="1425845"/>
-              <a:ext cx="455613" cy="533400"/>
+              <a:off x="584415" y="1256337"/>
+              <a:ext cx="494167" cy="578537"/>
             </a:xfrm>
             <a:custGeom>
               <a:avLst>
@@ -4323,8 +4323,8 @@
           </p:nvSpPr>
           <p:spPr bwMode="auto">
             <a:xfrm>
-              <a:off x="2195145" y="1437543"/>
-              <a:ext cx="457200" cy="533400"/>
+              <a:off x="1994014" y="1269025"/>
+              <a:ext cx="495889" cy="578537"/>
             </a:xfrm>
             <a:custGeom>
               <a:avLst>
@@ -4562,8 +4562,8 @@
           </p:nvSpPr>
           <p:spPr bwMode="auto">
             <a:xfrm>
-              <a:off x="3949456" y="1414494"/>
-              <a:ext cx="457200" cy="533400"/>
+              <a:off x="3896776" y="1244025"/>
+              <a:ext cx="495889" cy="578537"/>
             </a:xfrm>
             <a:custGeom>
               <a:avLst>
@@ -4801,8 +4801,8 @@
           </p:nvSpPr>
           <p:spPr>
             <a:xfrm>
-              <a:off x="5020070" y="1435833"/>
-              <a:ext cx="455612" cy="533400"/>
+              <a:off x="5057986" y="1267170"/>
+              <a:ext cx="494166" cy="578537"/>
             </a:xfrm>
             <a:custGeom>
               <a:avLst>
@@ -5040,8 +5040,8 @@
           </p:nvSpPr>
           <p:spPr bwMode="auto">
             <a:xfrm>
-              <a:off x="4399768" y="3991354"/>
-              <a:ext cx="356356" cy="932881"/>
+              <a:off x="5165889" y="4043278"/>
+              <a:ext cx="386511" cy="1011822"/>
             </a:xfrm>
             <a:custGeom>
               <a:avLst>
@@ -5287,8 +5287,8 @@
           </p:nvSpPr>
           <p:spPr bwMode="auto">
             <a:xfrm>
-              <a:off x="7658711" y="3987938"/>
-              <a:ext cx="356356" cy="932881"/>
+              <a:off x="8059865" y="4043278"/>
+              <a:ext cx="386511" cy="1011822"/>
             </a:xfrm>
             <a:custGeom>
               <a:avLst>
@@ -5534,8 +5534,8 @@
           </p:nvSpPr>
           <p:spPr bwMode="auto">
             <a:xfrm>
-              <a:off x="3794946" y="4990717"/>
-              <a:ext cx="1566000" cy="733090"/>
+              <a:off x="3205365" y="5122871"/>
+              <a:ext cx="1418603" cy="795125"/>
             </a:xfrm>
             <a:custGeom>
               <a:avLst/>
@@ -5831,8 +5831,8 @@
           </p:nvSpPr>
           <p:spPr bwMode="auto">
             <a:xfrm>
-              <a:off x="645338" y="3123470"/>
-              <a:ext cx="7849120" cy="816545"/>
+              <a:off x="313061" y="3097616"/>
+              <a:ext cx="8513319" cy="885642"/>
             </a:xfrm>
             <a:custGeom>
               <a:avLst/>
@@ -6052,8 +6052,8 @@
           </p:nvSpPr>
           <p:spPr bwMode="auto">
             <a:xfrm>
-              <a:off x="428906" y="2032857"/>
-              <a:ext cx="2651472" cy="533400"/>
+              <a:off x="78314" y="1914714"/>
+              <a:ext cx="2875842" cy="578537"/>
             </a:xfrm>
             <a:custGeom>
               <a:avLst/>
@@ -6265,8 +6265,8 @@
           </p:nvSpPr>
           <p:spPr bwMode="auto">
             <a:xfrm>
-              <a:off x="7053889" y="4990717"/>
-              <a:ext cx="1566000" cy="733090"/>
+              <a:off x="7543820" y="5122871"/>
+              <a:ext cx="1418603" cy="795125"/>
             </a:xfrm>
             <a:custGeom>
               <a:avLst/>
@@ -6406,8 +6406,8 @@
           </p:nvSpPr>
           <p:spPr bwMode="auto">
             <a:xfrm>
-              <a:off x="3949456" y="2032855"/>
-              <a:ext cx="2584800" cy="533400"/>
+              <a:off x="3896776" y="1914712"/>
+              <a:ext cx="2803528" cy="578537"/>
             </a:xfrm>
             <a:custGeom>
               <a:avLst/>
@@ -6640,8 +6640,8 @@
           </p:nvSpPr>
           <p:spPr bwMode="auto">
             <a:xfrm>
-              <a:off x="1526838" y="2607531"/>
-              <a:ext cx="455613" cy="474662"/>
+              <a:off x="1269154" y="2538018"/>
+              <a:ext cx="494167" cy="514828"/>
             </a:xfrm>
             <a:custGeom>
               <a:avLst>
@@ -6879,8 +6879,8 @@
           </p:nvSpPr>
           <p:spPr bwMode="auto">
             <a:xfrm>
-              <a:off x="5014847" y="2607531"/>
-              <a:ext cx="454025" cy="474662"/>
+              <a:off x="5052321" y="2538018"/>
+              <a:ext cx="492445" cy="514828"/>
             </a:xfrm>
             <a:custGeom>
               <a:avLst>
@@ -7118,8 +7118,8 @@
           </p:nvSpPr>
           <p:spPr>
             <a:xfrm>
-              <a:off x="7864549" y="1428283"/>
-              <a:ext cx="457200" cy="1406525"/>
+              <a:off x="8143167" y="1258981"/>
+              <a:ext cx="495889" cy="1525546"/>
             </a:xfrm>
             <a:custGeom>
               <a:avLst>
@@ -7368,8 +7368,8 @@
           </p:nvSpPr>
           <p:spPr bwMode="auto">
             <a:xfrm>
-              <a:off x="7053890" y="2918358"/>
-              <a:ext cx="1368152" cy="533400"/>
+              <a:off x="7263909" y="2875147"/>
+              <a:ext cx="1483926" cy="578537"/>
             </a:xfrm>
             <a:custGeom>
               <a:avLst/>
@@ -7581,8 +7581,8 @@
           </p:nvSpPr>
           <p:spPr bwMode="auto">
             <a:xfrm>
-              <a:off x="1138481" y="3991351"/>
-              <a:ext cx="356358" cy="936056"/>
+              <a:off x="2271909" y="4041556"/>
+              <a:ext cx="386513" cy="1015266"/>
             </a:xfrm>
             <a:custGeom>
               <a:avLst>
@@ -7828,8 +7828,8 @@
           </p:nvSpPr>
           <p:spPr bwMode="auto">
             <a:xfrm>
-              <a:off x="2769124" y="3991354"/>
-              <a:ext cx="356358" cy="934939"/>
+              <a:off x="3718899" y="4042162"/>
+              <a:ext cx="386513" cy="1014054"/>
             </a:xfrm>
             <a:custGeom>
               <a:avLst>
@@ -8075,8 +8075,8 @@
           </p:nvSpPr>
           <p:spPr bwMode="auto">
             <a:xfrm>
-              <a:off x="533660" y="4990717"/>
-              <a:ext cx="1566000" cy="733090"/>
+              <a:off x="313061" y="5122871"/>
+              <a:ext cx="1418603" cy="795125"/>
             </a:xfrm>
             <a:custGeom>
               <a:avLst/>
@@ -8309,8 +8309,8 @@
           </p:nvSpPr>
           <p:spPr bwMode="auto">
             <a:xfrm>
-              <a:off x="6028072" y="3994337"/>
-              <a:ext cx="356356" cy="932881"/>
+              <a:off x="6612877" y="4043278"/>
+              <a:ext cx="386511" cy="1011822"/>
             </a:xfrm>
             <a:custGeom>
               <a:avLst>
@@ -8556,8 +8556,8 @@
           </p:nvSpPr>
           <p:spPr bwMode="auto">
             <a:xfrm>
-              <a:off x="2164303" y="4990717"/>
-              <a:ext cx="1566000" cy="733090"/>
+              <a:off x="1759213" y="5122871"/>
+              <a:ext cx="1418603" cy="795125"/>
             </a:xfrm>
             <a:custGeom>
               <a:avLst/>
@@ -8828,229 +8828,14 @@
         </p:sp>
         <p:sp>
           <p:nvSpPr>
-            <p:cNvPr id="64" name="Rectangle 4"/>
-            <p:cNvSpPr/>
-            <p:nvPr/>
-          </p:nvSpPr>
-          <p:spPr>
-            <a:xfrm>
-              <a:off x="645338" y="4314188"/>
-              <a:ext cx="6216454" cy="418951"/>
-            </a:xfrm>
-            <a:custGeom>
-              <a:avLst/>
-              <a:gdLst>
-                <a:gd name="f0" fmla="val 0"/>
-                <a:gd name="f1" fmla="val 21600"/>
-              </a:gdLst>
-              <a:ahLst/>
-              <a:cxnLst>
-                <a:cxn ang="3cd4">
-                  <a:pos x="hc" y="t"/>
-                </a:cxn>
-                <a:cxn ang="0">
-                  <a:pos x="r" y="vc"/>
-                </a:cxn>
-                <a:cxn ang="cd4">
-                  <a:pos x="hc" y="b"/>
-                </a:cxn>
-                <a:cxn ang="cd2">
-                  <a:pos x="l" y="vc"/>
-                </a:cxn>
-              </a:cxnLst>
-              <a:rect l="l" t="t" r="r" b="b"/>
-              <a:pathLst>
-                <a:path w="21600" h="21600">
-                  <a:moveTo>
-                    <a:pt x="f0" y="f0"/>
-                  </a:moveTo>
-                  <a:lnTo>
-                    <a:pt x="f1" y="f0"/>
-                  </a:lnTo>
-                  <a:lnTo>
-                    <a:pt x="f1" y="f1"/>
-                  </a:lnTo>
-                  <a:lnTo>
-                    <a:pt x="f0" y="f1"/>
-                  </a:lnTo>
-                  <a:lnTo>
-                    <a:pt x="f0" y="f0"/>
-                  </a:lnTo>
-                  <a:close/>
-                </a:path>
-              </a:pathLst>
-            </a:custGeom>
-            <a:solidFill>
-              <a:srgbClr val="8EB4E3">
-                <a:alpha val="75000"/>
-              </a:srgbClr>
-            </a:solidFill>
-            <a:ln w="0">
-              <a:noFill/>
-              <a:prstDash val="solid"/>
-            </a:ln>
-          </p:spPr>
-          <p:txBody>
-            <a:bodyPr lIns="90000" tIns="45000" rIns="90000" bIns="45000" anchor="ctr" anchorCtr="1" compatLnSpc="0"/>
-            <a:lstStyle>
-              <a:defPPr>
-                <a:defRPr lang="en-US"/>
-              </a:defPPr>
-              <a:lvl1pPr algn="l" rtl="0" fontAlgn="base">
-                <a:spcBef>
-                  <a:spcPct val="0"/>
-                </a:spcBef>
-                <a:spcAft>
-                  <a:spcPct val="0"/>
-                </a:spcAft>
-                <a:defRPr kern="1200">
-                  <a:solidFill>
-                    <a:schemeClr val="tx1"/>
-                  </a:solidFill>
-                  <a:latin typeface="Arial" pitchFamily="34" charset="0"/>
-                  <a:ea typeface="ＭＳ Ｐゴシック" pitchFamily="34" charset="-128"/>
-                  <a:cs typeface="+mn-cs"/>
-                </a:defRPr>
-              </a:lvl1pPr>
-              <a:lvl2pPr marL="457200" algn="l" rtl="0" fontAlgn="base">
-                <a:spcBef>
-                  <a:spcPct val="0"/>
-                </a:spcBef>
-                <a:spcAft>
-                  <a:spcPct val="0"/>
-                </a:spcAft>
-                <a:defRPr kern="1200">
-                  <a:solidFill>
-                    <a:schemeClr val="tx1"/>
-                  </a:solidFill>
-                  <a:latin typeface="Arial" pitchFamily="34" charset="0"/>
-                  <a:ea typeface="ＭＳ Ｐゴシック" pitchFamily="34" charset="-128"/>
-                  <a:cs typeface="+mn-cs"/>
-                </a:defRPr>
-              </a:lvl2pPr>
-              <a:lvl3pPr marL="914400" algn="l" rtl="0" fontAlgn="base">
-                <a:spcBef>
-                  <a:spcPct val="0"/>
-                </a:spcBef>
-                <a:spcAft>
-                  <a:spcPct val="0"/>
-                </a:spcAft>
-                <a:defRPr kern="1200">
-                  <a:solidFill>
-                    <a:schemeClr val="tx1"/>
-                  </a:solidFill>
-                  <a:latin typeface="Arial" pitchFamily="34" charset="0"/>
-                  <a:ea typeface="ＭＳ Ｐゴシック" pitchFamily="34" charset="-128"/>
-                  <a:cs typeface="+mn-cs"/>
-                </a:defRPr>
-              </a:lvl3pPr>
-              <a:lvl4pPr marL="1371600" algn="l" rtl="0" fontAlgn="base">
-                <a:spcBef>
-                  <a:spcPct val="0"/>
-                </a:spcBef>
-                <a:spcAft>
-                  <a:spcPct val="0"/>
-                </a:spcAft>
-                <a:defRPr kern="1200">
-                  <a:solidFill>
-                    <a:schemeClr val="tx1"/>
-                  </a:solidFill>
-                  <a:latin typeface="Arial" pitchFamily="34" charset="0"/>
-                  <a:ea typeface="ＭＳ Ｐゴシック" pitchFamily="34" charset="-128"/>
-                  <a:cs typeface="+mn-cs"/>
-                </a:defRPr>
-              </a:lvl4pPr>
-              <a:lvl5pPr marL="1828800" algn="l" rtl="0" fontAlgn="base">
-                <a:spcBef>
-                  <a:spcPct val="0"/>
-                </a:spcBef>
-                <a:spcAft>
-                  <a:spcPct val="0"/>
-                </a:spcAft>
-                <a:defRPr kern="1200">
-                  <a:solidFill>
-                    <a:schemeClr val="tx1"/>
-                  </a:solidFill>
-                  <a:latin typeface="Arial" pitchFamily="34" charset="0"/>
-                  <a:ea typeface="ＭＳ Ｐゴシック" pitchFamily="34" charset="-128"/>
-                  <a:cs typeface="+mn-cs"/>
-                </a:defRPr>
-              </a:lvl5pPr>
-              <a:lvl6pPr marL="2286000" algn="l" defTabSz="914400" rtl="0" eaLnBrk="1" latinLnBrk="0" hangingPunct="1">
-                <a:defRPr kern="1200">
-                  <a:solidFill>
-                    <a:schemeClr val="tx1"/>
-                  </a:solidFill>
-                  <a:latin typeface="Arial" pitchFamily="34" charset="0"/>
-                  <a:ea typeface="ＭＳ Ｐゴシック" pitchFamily="34" charset="-128"/>
-                  <a:cs typeface="+mn-cs"/>
-                </a:defRPr>
-              </a:lvl6pPr>
-              <a:lvl7pPr marL="2743200" algn="l" defTabSz="914400" rtl="0" eaLnBrk="1" latinLnBrk="0" hangingPunct="1">
-                <a:defRPr kern="1200">
-                  <a:solidFill>
-                    <a:schemeClr val="tx1"/>
-                  </a:solidFill>
-                  <a:latin typeface="Arial" pitchFamily="34" charset="0"/>
-                  <a:ea typeface="ＭＳ Ｐゴシック" pitchFamily="34" charset="-128"/>
-                  <a:cs typeface="+mn-cs"/>
-                </a:defRPr>
-              </a:lvl7pPr>
-              <a:lvl8pPr marL="3200400" algn="l" defTabSz="914400" rtl="0" eaLnBrk="1" latinLnBrk="0" hangingPunct="1">
-                <a:defRPr kern="1200">
-                  <a:solidFill>
-                    <a:schemeClr val="tx1"/>
-                  </a:solidFill>
-                  <a:latin typeface="Arial" pitchFamily="34" charset="0"/>
-                  <a:ea typeface="ＭＳ Ｐゴシック" pitchFamily="34" charset="-128"/>
-                  <a:cs typeface="+mn-cs"/>
-                </a:defRPr>
-              </a:lvl8pPr>
-              <a:lvl9pPr marL="3657600" algn="l" defTabSz="914400" rtl="0" eaLnBrk="1" latinLnBrk="0" hangingPunct="1">
-                <a:defRPr kern="1200">
-                  <a:solidFill>
-                    <a:schemeClr val="tx1"/>
-                  </a:solidFill>
-                  <a:latin typeface="Arial" pitchFamily="34" charset="0"/>
-                  <a:ea typeface="ＭＳ Ｐゴシック" pitchFamily="34" charset="-128"/>
-                  <a:cs typeface="+mn-cs"/>
-                </a:defRPr>
-              </a:lvl9pPr>
-            </a:lstStyle>
-            <a:p>
-              <a:pPr algn="ctr">
-                <a:spcBef>
-                  <a:spcPts val="0"/>
-                </a:spcBef>
-                <a:spcAft>
-                  <a:spcPts val="0"/>
-                </a:spcAft>
-                <a:defRPr/>
-              </a:pPr>
-              <a:r>
-                <a:rPr lang="en-US" sz="2000" dirty="0">
-                  <a:solidFill>
-                    <a:srgbClr val="000000"/>
-                  </a:solidFill>
-                  <a:latin typeface="Arial" pitchFamily="34"/>
-                  <a:ea typeface="Arial Unicode MS" pitchFamily="2"/>
-                  <a:cs typeface="Arial" pitchFamily="34"/>
-                </a:rPr>
-                <a:t>Instrumentation wrapper</a:t>
-              </a:r>
-            </a:p>
-          </p:txBody>
-        </p:sp>
-        <p:sp>
-          <p:nvSpPr>
             <p:cNvPr id="65" name="Rectangle 34"/>
             <p:cNvSpPr/>
             <p:nvPr/>
           </p:nvSpPr>
           <p:spPr bwMode="auto">
             <a:xfrm>
-              <a:off x="5423250" y="4990717"/>
-              <a:ext cx="1566000" cy="733090"/>
+              <a:off x="6097669" y="5122871"/>
+              <a:ext cx="1418603" cy="795125"/>
             </a:xfrm>
             <a:custGeom>
               <a:avLst/>
@@ -9314,8 +9099,8 @@
           </p:nvSpPr>
           <p:spPr>
             <a:xfrm>
-              <a:off x="3245168" y="827943"/>
-              <a:ext cx="1243891" cy="533400"/>
+              <a:off x="3132890" y="607840"/>
+              <a:ext cx="1349150" cy="578537"/>
             </a:xfrm>
             <a:custGeom>
               <a:avLst/>
@@ -9527,8 +9312,8 @@
           </p:nvGrpSpPr>
           <p:grpSpPr>
             <a:xfrm>
-              <a:off x="6062526" y="813954"/>
-              <a:ext cx="1243891" cy="576064"/>
+              <a:off x="6188655" y="592667"/>
+              <a:ext cx="1349150" cy="624811"/>
               <a:chOff x="9228783" y="2492896"/>
               <a:chExt cx="1440160" cy="576064"/>
             </a:xfrm>
@@ -9922,8 +9707,8 @@
           </p:nvSpPr>
           <p:spPr bwMode="auto">
             <a:xfrm rot="7134194">
-              <a:off x="3201336" y="1423252"/>
-              <a:ext cx="457200" cy="680814"/>
+              <a:off x="3085349" y="1253524"/>
+              <a:ext cx="495889" cy="738425"/>
             </a:xfrm>
             <a:custGeom>
               <a:avLst>
@@ -10161,8 +9946,8 @@
           </p:nvSpPr>
           <p:spPr>
             <a:xfrm>
-              <a:off x="6033400" y="1427311"/>
-              <a:ext cx="455612" cy="533400"/>
+              <a:off x="6157065" y="1257927"/>
+              <a:ext cx="494166" cy="578537"/>
             </a:xfrm>
             <a:custGeom>
               <a:avLst>
@@ -10400,8 +10185,8 @@
           </p:nvSpPr>
           <p:spPr bwMode="auto">
             <a:xfrm>
-              <a:off x="503218" y="3175912"/>
-              <a:ext cx="2149129" cy="407787"/>
+              <a:off x="158914" y="3154496"/>
+              <a:ext cx="2330990" cy="442294"/>
             </a:xfrm>
             <a:prstGeom prst="homePlate">
               <a:avLst/>
@@ -10636,6 +10421,764 @@
                 <a:ea typeface="Arial Unicode MS" pitchFamily="2"/>
                 <a:cs typeface="Tahoma" pitchFamily="2"/>
               </a:endParaRPr>
+            </a:p>
+          </p:txBody>
+        </p:sp>
+        <p:sp>
+          <p:nvSpPr>
+            <p:cNvPr id="58" name="Rectangle 32"/>
+            <p:cNvSpPr/>
+            <p:nvPr/>
+          </p:nvSpPr>
+          <p:spPr bwMode="auto">
+            <a:xfrm>
+              <a:off x="4651517" y="5122871"/>
+              <a:ext cx="1418603" cy="795125"/>
+            </a:xfrm>
+            <a:custGeom>
+              <a:avLst/>
+              <a:gdLst>
+                <a:gd name="f0" fmla="val 0"/>
+                <a:gd name="f1" fmla="val 21600"/>
+              </a:gdLst>
+              <a:ahLst/>
+              <a:cxnLst>
+                <a:cxn ang="3cd4">
+                  <a:pos x="hc" y="t"/>
+                </a:cxn>
+                <a:cxn ang="0">
+                  <a:pos x="r" y="vc"/>
+                </a:cxn>
+                <a:cxn ang="cd4">
+                  <a:pos x="hc" y="b"/>
+                </a:cxn>
+                <a:cxn ang="cd2">
+                  <a:pos x="l" y="vc"/>
+                </a:cxn>
+              </a:cxnLst>
+              <a:rect l="l" t="t" r="r" b="b"/>
+              <a:pathLst>
+                <a:path w="21600" h="21600">
+                  <a:moveTo>
+                    <a:pt x="f0" y="f0"/>
+                  </a:moveTo>
+                  <a:lnTo>
+                    <a:pt x="f1" y="f0"/>
+                  </a:lnTo>
+                  <a:lnTo>
+                    <a:pt x="f1" y="f1"/>
+                  </a:lnTo>
+                  <a:lnTo>
+                    <a:pt x="f0" y="f1"/>
+                  </a:lnTo>
+                  <a:lnTo>
+                    <a:pt x="f0" y="f0"/>
+                  </a:lnTo>
+                  <a:close/>
+                </a:path>
+              </a:pathLst>
+            </a:custGeom>
+            <a:solidFill>
+              <a:srgbClr val="008000"/>
+            </a:solidFill>
+            <a:ln w="9360">
+              <a:noFill/>
+              <a:prstDash val="solid"/>
+            </a:ln>
+          </p:spPr>
+          <p:txBody>
+            <a:bodyPr lIns="90000" tIns="45000" rIns="90000" bIns="45000" anchor="ctr" compatLnSpc="0"/>
+            <a:lstStyle>
+              <a:defPPr>
+                <a:defRPr lang="en-US"/>
+              </a:defPPr>
+              <a:lvl1pPr algn="l" rtl="0" fontAlgn="base">
+                <a:spcBef>
+                  <a:spcPct val="0"/>
+                </a:spcBef>
+                <a:spcAft>
+                  <a:spcPct val="0"/>
+                </a:spcAft>
+                <a:defRPr kern="1200">
+                  <a:solidFill>
+                    <a:schemeClr val="tx1"/>
+                  </a:solidFill>
+                  <a:latin typeface="Arial" pitchFamily="34" charset="0"/>
+                  <a:ea typeface="ＭＳ Ｐゴシック" pitchFamily="34" charset="-128"/>
+                  <a:cs typeface="+mn-cs"/>
+                </a:defRPr>
+              </a:lvl1pPr>
+              <a:lvl2pPr marL="457200" algn="l" rtl="0" fontAlgn="base">
+                <a:spcBef>
+                  <a:spcPct val="0"/>
+                </a:spcBef>
+                <a:spcAft>
+                  <a:spcPct val="0"/>
+                </a:spcAft>
+                <a:defRPr kern="1200">
+                  <a:solidFill>
+                    <a:schemeClr val="tx1"/>
+                  </a:solidFill>
+                  <a:latin typeface="Arial" pitchFamily="34" charset="0"/>
+                  <a:ea typeface="ＭＳ Ｐゴシック" pitchFamily="34" charset="-128"/>
+                  <a:cs typeface="+mn-cs"/>
+                </a:defRPr>
+              </a:lvl2pPr>
+              <a:lvl3pPr marL="914400" algn="l" rtl="0" fontAlgn="base">
+                <a:spcBef>
+                  <a:spcPct val="0"/>
+                </a:spcBef>
+                <a:spcAft>
+                  <a:spcPct val="0"/>
+                </a:spcAft>
+                <a:defRPr kern="1200">
+                  <a:solidFill>
+                    <a:schemeClr val="tx1"/>
+                  </a:solidFill>
+                  <a:latin typeface="Arial" pitchFamily="34" charset="0"/>
+                  <a:ea typeface="ＭＳ Ｐゴシック" pitchFamily="34" charset="-128"/>
+                  <a:cs typeface="+mn-cs"/>
+                </a:defRPr>
+              </a:lvl3pPr>
+              <a:lvl4pPr marL="1371600" algn="l" rtl="0" fontAlgn="base">
+                <a:spcBef>
+                  <a:spcPct val="0"/>
+                </a:spcBef>
+                <a:spcAft>
+                  <a:spcPct val="0"/>
+                </a:spcAft>
+                <a:defRPr kern="1200">
+                  <a:solidFill>
+                    <a:schemeClr val="tx1"/>
+                  </a:solidFill>
+                  <a:latin typeface="Arial" pitchFamily="34" charset="0"/>
+                  <a:ea typeface="ＭＳ Ｐゴシック" pitchFamily="34" charset="-128"/>
+                  <a:cs typeface="+mn-cs"/>
+                </a:defRPr>
+              </a:lvl4pPr>
+              <a:lvl5pPr marL="1828800" algn="l" rtl="0" fontAlgn="base">
+                <a:spcBef>
+                  <a:spcPct val="0"/>
+                </a:spcBef>
+                <a:spcAft>
+                  <a:spcPct val="0"/>
+                </a:spcAft>
+                <a:defRPr kern="1200">
+                  <a:solidFill>
+                    <a:schemeClr val="tx1"/>
+                  </a:solidFill>
+                  <a:latin typeface="Arial" pitchFamily="34" charset="0"/>
+                  <a:ea typeface="ＭＳ Ｐゴシック" pitchFamily="34" charset="-128"/>
+                  <a:cs typeface="+mn-cs"/>
+                </a:defRPr>
+              </a:lvl5pPr>
+              <a:lvl6pPr marL="2286000" algn="l" defTabSz="914400" rtl="0" eaLnBrk="1" latinLnBrk="0" hangingPunct="1">
+                <a:defRPr kern="1200">
+                  <a:solidFill>
+                    <a:schemeClr val="tx1"/>
+                  </a:solidFill>
+                  <a:latin typeface="Arial" pitchFamily="34" charset="0"/>
+                  <a:ea typeface="ＭＳ Ｐゴシック" pitchFamily="34" charset="-128"/>
+                  <a:cs typeface="+mn-cs"/>
+                </a:defRPr>
+              </a:lvl6pPr>
+              <a:lvl7pPr marL="2743200" algn="l" defTabSz="914400" rtl="0" eaLnBrk="1" latinLnBrk="0" hangingPunct="1">
+                <a:defRPr kern="1200">
+                  <a:solidFill>
+                    <a:schemeClr val="tx1"/>
+                  </a:solidFill>
+                  <a:latin typeface="Arial" pitchFamily="34" charset="0"/>
+                  <a:ea typeface="ＭＳ Ｐゴシック" pitchFamily="34" charset="-128"/>
+                  <a:cs typeface="+mn-cs"/>
+                </a:defRPr>
+              </a:lvl7pPr>
+              <a:lvl8pPr marL="3200400" algn="l" defTabSz="914400" rtl="0" eaLnBrk="1" latinLnBrk="0" hangingPunct="1">
+                <a:defRPr kern="1200">
+                  <a:solidFill>
+                    <a:schemeClr val="tx1"/>
+                  </a:solidFill>
+                  <a:latin typeface="Arial" pitchFamily="34" charset="0"/>
+                  <a:ea typeface="ＭＳ Ｐゴシック" pitchFamily="34" charset="-128"/>
+                  <a:cs typeface="+mn-cs"/>
+                </a:defRPr>
+              </a:lvl8pPr>
+              <a:lvl9pPr marL="3657600" algn="l" defTabSz="914400" rtl="0" eaLnBrk="1" latinLnBrk="0" hangingPunct="1">
+                <a:defRPr kern="1200">
+                  <a:solidFill>
+                    <a:schemeClr val="tx1"/>
+                  </a:solidFill>
+                  <a:latin typeface="Arial" pitchFamily="34" charset="0"/>
+                  <a:ea typeface="ＭＳ Ｐゴシック" pitchFamily="34" charset="-128"/>
+                  <a:cs typeface="+mn-cs"/>
+                </a:defRPr>
+              </a:lvl9pPr>
+            </a:lstStyle>
+            <a:p>
+              <a:pPr algn="ctr">
+                <a:spcBef>
+                  <a:spcPts val="0"/>
+                </a:spcBef>
+                <a:spcAft>
+                  <a:spcPts val="0"/>
+                </a:spcAft>
+                <a:defRPr/>
+              </a:pPr>
+              <a:r>
+                <a:rPr lang="en-US" sz="1200" dirty="0" smtClean="0">
+                  <a:solidFill>
+                    <a:srgbClr val="FFFFFF"/>
+                  </a:solidFill>
+                  <a:latin typeface="Arial" pitchFamily="34"/>
+                  <a:ea typeface="Arial Unicode MS" pitchFamily="2"/>
+                  <a:cs typeface="Tahoma" pitchFamily="2"/>
+                </a:rPr>
+                <a:t>I/O Activity Recording</a:t>
+              </a:r>
+              <a:r>
+                <a:rPr lang="en-US" sz="1200" dirty="0">
+                  <a:solidFill>
+                    <a:srgbClr val="FFFFFF"/>
+                  </a:solidFill>
+                  <a:latin typeface="Arial" pitchFamily="34"/>
+                  <a:ea typeface="Arial Unicode MS" pitchFamily="2"/>
+                  <a:cs typeface="Tahoma" pitchFamily="2"/>
+                </a:rPr>
+                <a:t/>
+              </a:r>
+              <a:br>
+                <a:rPr lang="en-US" sz="1200" dirty="0">
+                  <a:solidFill>
+                    <a:srgbClr val="FFFFFF"/>
+                  </a:solidFill>
+                  <a:latin typeface="Arial" pitchFamily="34"/>
+                  <a:ea typeface="Arial Unicode MS" pitchFamily="2"/>
+                  <a:cs typeface="Tahoma" pitchFamily="2"/>
+                </a:rPr>
+              </a:br>
+              <a:r>
+                <a:rPr lang="en-US" sz="1200" dirty="0" smtClean="0">
+                  <a:solidFill>
+                    <a:srgbClr val="FFFFFF"/>
+                  </a:solidFill>
+                  <a:latin typeface="Arial" pitchFamily="34"/>
+                  <a:ea typeface="Arial Unicode MS" pitchFamily="2"/>
+                  <a:cs typeface="Tahoma" pitchFamily="2"/>
+                </a:rPr>
+                <a:t>(</a:t>
+              </a:r>
+              <a:r>
+                <a:rPr lang="en-US" sz="1200" dirty="0" err="1" smtClean="0">
+                  <a:solidFill>
+                    <a:srgbClr val="FFFFFF"/>
+                  </a:solidFill>
+                  <a:latin typeface="Arial" pitchFamily="34"/>
+                  <a:ea typeface="Arial Unicode MS" pitchFamily="2"/>
+                  <a:cs typeface="Tahoma" pitchFamily="2"/>
+                </a:rPr>
+                <a:t>Posix</a:t>
+              </a:r>
+              <a:r>
+                <a:rPr lang="en-US" sz="1200" dirty="0" smtClean="0">
+                  <a:solidFill>
+                    <a:srgbClr val="FFFFFF"/>
+                  </a:solidFill>
+                  <a:latin typeface="Arial" pitchFamily="34"/>
+                  <a:ea typeface="Arial Unicode MS" pitchFamily="2"/>
+                  <a:cs typeface="Tahoma" pitchFamily="2"/>
+                </a:rPr>
+                <a:t> I/O, </a:t>
+              </a:r>
+              <a:br>
+                <a:rPr lang="en-US" sz="1200" dirty="0" smtClean="0">
+                  <a:solidFill>
+                    <a:srgbClr val="FFFFFF"/>
+                  </a:solidFill>
+                  <a:latin typeface="Arial" pitchFamily="34"/>
+                  <a:ea typeface="Arial Unicode MS" pitchFamily="2"/>
+                  <a:cs typeface="Tahoma" pitchFamily="2"/>
+                </a:rPr>
+              </a:br>
+              <a:r>
+                <a:rPr lang="en-US" sz="1200" dirty="0" smtClean="0">
+                  <a:solidFill>
+                    <a:srgbClr val="FFFFFF"/>
+                  </a:solidFill>
+                  <a:latin typeface="Arial" pitchFamily="34"/>
+                  <a:ea typeface="Arial Unicode MS" pitchFamily="2"/>
+                  <a:cs typeface="Tahoma" pitchFamily="2"/>
+                </a:rPr>
+                <a:t>MPI-IO)</a:t>
+              </a:r>
+              <a:endParaRPr lang="en-US" sz="1200" dirty="0">
+                <a:solidFill>
+                  <a:srgbClr val="FFFFFF"/>
+                </a:solidFill>
+                <a:latin typeface="Arial" pitchFamily="34"/>
+                <a:ea typeface="Arial Unicode MS" pitchFamily="2"/>
+                <a:cs typeface="Tahoma" pitchFamily="2"/>
+              </a:endParaRPr>
+            </a:p>
+          </p:txBody>
+        </p:sp>
+        <p:sp>
+          <p:nvSpPr>
+            <p:cNvPr id="73" name="Up Arrow 35"/>
+            <p:cNvSpPr/>
+            <p:nvPr/>
+          </p:nvSpPr>
+          <p:spPr bwMode="auto">
+            <a:xfrm>
+              <a:off x="824919" y="4041556"/>
+              <a:ext cx="386513" cy="1015266"/>
+            </a:xfrm>
+            <a:custGeom>
+              <a:avLst>
+                <a:gd name="f0" fmla="val 5400"/>
+                <a:gd name="f1" fmla="val 5400"/>
+              </a:avLst>
+              <a:gdLst>
+                <a:gd name="f2" fmla="val w"/>
+                <a:gd name="f3" fmla="val h"/>
+                <a:gd name="f4" fmla="val 0"/>
+                <a:gd name="f5" fmla="val 21600"/>
+                <a:gd name="f6" fmla="val 10800"/>
+                <a:gd name="f7" fmla="*/ f2 1 21600"/>
+                <a:gd name="f8" fmla="*/ f3 1 21600"/>
+                <a:gd name="f9" fmla="pin 0 f1 10800"/>
+                <a:gd name="f10" fmla="pin 0 f0 21600"/>
+                <a:gd name="f11" fmla="val f9"/>
+                <a:gd name="f12" fmla="val f10"/>
+                <a:gd name="f13" fmla="+- 21600 0 f9"/>
+                <a:gd name="f14" fmla="*/ f9 f7 1"/>
+                <a:gd name="f15" fmla="*/ f10 f8 1"/>
+                <a:gd name="f16" fmla="*/ 21600 f8 1"/>
+                <a:gd name="f17" fmla="*/ f12 f11 1"/>
+                <a:gd name="f18" fmla="*/ f11 f7 1"/>
+                <a:gd name="f19" fmla="*/ f13 f7 1"/>
+                <a:gd name="f20" fmla="*/ f17 1 10800"/>
+                <a:gd name="f21" fmla="+- f12 0 f20"/>
+                <a:gd name="f22" fmla="*/ f21 f8 1"/>
+              </a:gdLst>
+              <a:ahLst>
+                <a:ahXY gdRefX="f1" minX="f4" maxX="f6" gdRefY="f0" minY="f4" maxY="f5">
+                  <a:pos x="f14" y="f15"/>
+                </a:ahXY>
+              </a:ahLst>
+              <a:cxnLst>
+                <a:cxn ang="3cd4">
+                  <a:pos x="hc" y="t"/>
+                </a:cxn>
+                <a:cxn ang="0">
+                  <a:pos x="r" y="vc"/>
+                </a:cxn>
+                <a:cxn ang="cd4">
+                  <a:pos x="hc" y="b"/>
+                </a:cxn>
+                <a:cxn ang="cd2">
+                  <a:pos x="l" y="vc"/>
+                </a:cxn>
+              </a:cxnLst>
+              <a:rect l="f18" t="f22" r="f19" b="f16"/>
+              <a:pathLst>
+                <a:path w="21600" h="21600">
+                  <a:moveTo>
+                    <a:pt x="f11" y="f5"/>
+                  </a:moveTo>
+                  <a:lnTo>
+                    <a:pt x="f11" y="f12"/>
+                  </a:lnTo>
+                  <a:lnTo>
+                    <a:pt x="f4" y="f12"/>
+                  </a:lnTo>
+                  <a:lnTo>
+                    <a:pt x="f6" y="f4"/>
+                  </a:lnTo>
+                  <a:lnTo>
+                    <a:pt x="f5" y="f12"/>
+                  </a:lnTo>
+                  <a:lnTo>
+                    <a:pt x="f13" y="f12"/>
+                  </a:lnTo>
+                  <a:lnTo>
+                    <a:pt x="f13" y="f5"/>
+                  </a:lnTo>
+                  <a:close/>
+                </a:path>
+              </a:pathLst>
+            </a:custGeom>
+            <a:gradFill>
+              <a:gsLst>
+                <a:gs pos="0">
+                  <a:srgbClr val="5E437F"/>
+                </a:gs>
+                <a:gs pos="100000">
+                  <a:srgbClr val="7B57A7"/>
+                </a:gs>
+              </a:gsLst>
+              <a:lin ang="16200000"/>
+            </a:gradFill>
+            <a:ln w="9360">
+              <a:noFill/>
+              <a:prstDash val="solid"/>
+            </a:ln>
+          </p:spPr>
+          <p:txBody>
+            <a:bodyPr lIns="90000" tIns="45000" rIns="90000" bIns="45000" anchor="ctr" compatLnSpc="0"/>
+            <a:lstStyle>
+              <a:defPPr>
+                <a:defRPr lang="en-US"/>
+              </a:defPPr>
+              <a:lvl1pPr algn="l" rtl="0" fontAlgn="base">
+                <a:spcBef>
+                  <a:spcPct val="0"/>
+                </a:spcBef>
+                <a:spcAft>
+                  <a:spcPct val="0"/>
+                </a:spcAft>
+                <a:defRPr kern="1200">
+                  <a:solidFill>
+                    <a:schemeClr val="tx1"/>
+                  </a:solidFill>
+                  <a:latin typeface="Arial" pitchFamily="34" charset="0"/>
+                  <a:ea typeface="ＭＳ Ｐゴシック" pitchFamily="34" charset="-128"/>
+                  <a:cs typeface="+mn-cs"/>
+                </a:defRPr>
+              </a:lvl1pPr>
+              <a:lvl2pPr marL="457200" algn="l" rtl="0" fontAlgn="base">
+                <a:spcBef>
+                  <a:spcPct val="0"/>
+                </a:spcBef>
+                <a:spcAft>
+                  <a:spcPct val="0"/>
+                </a:spcAft>
+                <a:defRPr kern="1200">
+                  <a:solidFill>
+                    <a:schemeClr val="tx1"/>
+                  </a:solidFill>
+                  <a:latin typeface="Arial" pitchFamily="34" charset="0"/>
+                  <a:ea typeface="ＭＳ Ｐゴシック" pitchFamily="34" charset="-128"/>
+                  <a:cs typeface="+mn-cs"/>
+                </a:defRPr>
+              </a:lvl2pPr>
+              <a:lvl3pPr marL="914400" algn="l" rtl="0" fontAlgn="base">
+                <a:spcBef>
+                  <a:spcPct val="0"/>
+                </a:spcBef>
+                <a:spcAft>
+                  <a:spcPct val="0"/>
+                </a:spcAft>
+                <a:defRPr kern="1200">
+                  <a:solidFill>
+                    <a:schemeClr val="tx1"/>
+                  </a:solidFill>
+                  <a:latin typeface="Arial" pitchFamily="34" charset="0"/>
+                  <a:ea typeface="ＭＳ Ｐゴシック" pitchFamily="34" charset="-128"/>
+                  <a:cs typeface="+mn-cs"/>
+                </a:defRPr>
+              </a:lvl3pPr>
+              <a:lvl4pPr marL="1371600" algn="l" rtl="0" fontAlgn="base">
+                <a:spcBef>
+                  <a:spcPct val="0"/>
+                </a:spcBef>
+                <a:spcAft>
+                  <a:spcPct val="0"/>
+                </a:spcAft>
+                <a:defRPr kern="1200">
+                  <a:solidFill>
+                    <a:schemeClr val="tx1"/>
+                  </a:solidFill>
+                  <a:latin typeface="Arial" pitchFamily="34" charset="0"/>
+                  <a:ea typeface="ＭＳ Ｐゴシック" pitchFamily="34" charset="-128"/>
+                  <a:cs typeface="+mn-cs"/>
+                </a:defRPr>
+              </a:lvl4pPr>
+              <a:lvl5pPr marL="1828800" algn="l" rtl="0" fontAlgn="base">
+                <a:spcBef>
+                  <a:spcPct val="0"/>
+                </a:spcBef>
+                <a:spcAft>
+                  <a:spcPct val="0"/>
+                </a:spcAft>
+                <a:defRPr kern="1200">
+                  <a:solidFill>
+                    <a:schemeClr val="tx1"/>
+                  </a:solidFill>
+                  <a:latin typeface="Arial" pitchFamily="34" charset="0"/>
+                  <a:ea typeface="ＭＳ Ｐゴシック" pitchFamily="34" charset="-128"/>
+                  <a:cs typeface="+mn-cs"/>
+                </a:defRPr>
+              </a:lvl5pPr>
+              <a:lvl6pPr marL="2286000" algn="l" defTabSz="914400" rtl="0" eaLnBrk="1" latinLnBrk="0" hangingPunct="1">
+                <a:defRPr kern="1200">
+                  <a:solidFill>
+                    <a:schemeClr val="tx1"/>
+                  </a:solidFill>
+                  <a:latin typeface="Arial" pitchFamily="34" charset="0"/>
+                  <a:ea typeface="ＭＳ Ｐゴシック" pitchFamily="34" charset="-128"/>
+                  <a:cs typeface="+mn-cs"/>
+                </a:defRPr>
+              </a:lvl6pPr>
+              <a:lvl7pPr marL="2743200" algn="l" defTabSz="914400" rtl="0" eaLnBrk="1" latinLnBrk="0" hangingPunct="1">
+                <a:defRPr kern="1200">
+                  <a:solidFill>
+                    <a:schemeClr val="tx1"/>
+                  </a:solidFill>
+                  <a:latin typeface="Arial" pitchFamily="34" charset="0"/>
+                  <a:ea typeface="ＭＳ Ｐゴシック" pitchFamily="34" charset="-128"/>
+                  <a:cs typeface="+mn-cs"/>
+                </a:defRPr>
+              </a:lvl7pPr>
+              <a:lvl8pPr marL="3200400" algn="l" defTabSz="914400" rtl="0" eaLnBrk="1" latinLnBrk="0" hangingPunct="1">
+                <a:defRPr kern="1200">
+                  <a:solidFill>
+                    <a:schemeClr val="tx1"/>
+                  </a:solidFill>
+                  <a:latin typeface="Arial" pitchFamily="34" charset="0"/>
+                  <a:ea typeface="ＭＳ Ｐゴシック" pitchFamily="34" charset="-128"/>
+                  <a:cs typeface="+mn-cs"/>
+                </a:defRPr>
+              </a:lvl8pPr>
+              <a:lvl9pPr marL="3657600" algn="l" defTabSz="914400" rtl="0" eaLnBrk="1" latinLnBrk="0" hangingPunct="1">
+                <a:defRPr kern="1200">
+                  <a:solidFill>
+                    <a:schemeClr val="tx1"/>
+                  </a:solidFill>
+                  <a:latin typeface="Arial" pitchFamily="34" charset="0"/>
+                  <a:ea typeface="ＭＳ Ｐゴシック" pitchFamily="34" charset="-128"/>
+                  <a:cs typeface="+mn-cs"/>
+                </a:defRPr>
+              </a:lvl9pPr>
+            </a:lstStyle>
+            <a:p>
+              <a:pPr hangingPunct="0">
+                <a:spcBef>
+                  <a:spcPts val="0"/>
+                </a:spcBef>
+                <a:spcAft>
+                  <a:spcPts val="0"/>
+                </a:spcAft>
+                <a:defRPr/>
+              </a:pPr>
+              <a:endParaRPr lang="en-US" sz="1200">
+                <a:latin typeface="Arial" pitchFamily="18"/>
+                <a:ea typeface="Arial Unicode MS" pitchFamily="2"/>
+                <a:cs typeface="Tahoma" pitchFamily="2"/>
+              </a:endParaRPr>
+            </a:p>
+          </p:txBody>
+        </p:sp>
+        <p:sp>
+          <p:nvSpPr>
+            <p:cNvPr id="64" name="Rectangle 4"/>
+            <p:cNvSpPr/>
+            <p:nvPr/>
+          </p:nvSpPr>
+          <p:spPr>
+            <a:xfrm>
+              <a:off x="313061" y="4389093"/>
+              <a:ext cx="7203211" cy="454403"/>
+            </a:xfrm>
+            <a:custGeom>
+              <a:avLst/>
+              <a:gdLst>
+                <a:gd name="f0" fmla="val 0"/>
+                <a:gd name="f1" fmla="val 21600"/>
+              </a:gdLst>
+              <a:ahLst/>
+              <a:cxnLst>
+                <a:cxn ang="3cd4">
+                  <a:pos x="hc" y="t"/>
+                </a:cxn>
+                <a:cxn ang="0">
+                  <a:pos x="r" y="vc"/>
+                </a:cxn>
+                <a:cxn ang="cd4">
+                  <a:pos x="hc" y="b"/>
+                </a:cxn>
+                <a:cxn ang="cd2">
+                  <a:pos x="l" y="vc"/>
+                </a:cxn>
+              </a:cxnLst>
+              <a:rect l="l" t="t" r="r" b="b"/>
+              <a:pathLst>
+                <a:path w="21600" h="21600">
+                  <a:moveTo>
+                    <a:pt x="f0" y="f0"/>
+                  </a:moveTo>
+                  <a:lnTo>
+                    <a:pt x="f1" y="f0"/>
+                  </a:lnTo>
+                  <a:lnTo>
+                    <a:pt x="f1" y="f1"/>
+                  </a:lnTo>
+                  <a:lnTo>
+                    <a:pt x="f0" y="f1"/>
+                  </a:lnTo>
+                  <a:lnTo>
+                    <a:pt x="f0" y="f0"/>
+                  </a:lnTo>
+                  <a:close/>
+                </a:path>
+              </a:pathLst>
+            </a:custGeom>
+            <a:solidFill>
+              <a:srgbClr val="8EB4E3">
+                <a:alpha val="75000"/>
+              </a:srgbClr>
+            </a:solidFill>
+            <a:ln w="0">
+              <a:noFill/>
+              <a:prstDash val="solid"/>
+            </a:ln>
+          </p:spPr>
+          <p:txBody>
+            <a:bodyPr lIns="90000" tIns="45000" rIns="90000" bIns="45000" anchor="ctr" anchorCtr="1" compatLnSpc="0"/>
+            <a:lstStyle>
+              <a:defPPr>
+                <a:defRPr lang="en-US"/>
+              </a:defPPr>
+              <a:lvl1pPr algn="l" rtl="0" fontAlgn="base">
+                <a:spcBef>
+                  <a:spcPct val="0"/>
+                </a:spcBef>
+                <a:spcAft>
+                  <a:spcPct val="0"/>
+                </a:spcAft>
+                <a:defRPr kern="1200">
+                  <a:solidFill>
+                    <a:schemeClr val="tx1"/>
+                  </a:solidFill>
+                  <a:latin typeface="Arial" pitchFamily="34" charset="0"/>
+                  <a:ea typeface="ＭＳ Ｐゴシック" pitchFamily="34" charset="-128"/>
+                  <a:cs typeface="+mn-cs"/>
+                </a:defRPr>
+              </a:lvl1pPr>
+              <a:lvl2pPr marL="457200" algn="l" rtl="0" fontAlgn="base">
+                <a:spcBef>
+                  <a:spcPct val="0"/>
+                </a:spcBef>
+                <a:spcAft>
+                  <a:spcPct val="0"/>
+                </a:spcAft>
+                <a:defRPr kern="1200">
+                  <a:solidFill>
+                    <a:schemeClr val="tx1"/>
+                  </a:solidFill>
+                  <a:latin typeface="Arial" pitchFamily="34" charset="0"/>
+                  <a:ea typeface="ＭＳ Ｐゴシック" pitchFamily="34" charset="-128"/>
+                  <a:cs typeface="+mn-cs"/>
+                </a:defRPr>
+              </a:lvl2pPr>
+              <a:lvl3pPr marL="914400" algn="l" rtl="0" fontAlgn="base">
+                <a:spcBef>
+                  <a:spcPct val="0"/>
+                </a:spcBef>
+                <a:spcAft>
+                  <a:spcPct val="0"/>
+                </a:spcAft>
+                <a:defRPr kern="1200">
+                  <a:solidFill>
+                    <a:schemeClr val="tx1"/>
+                  </a:solidFill>
+                  <a:latin typeface="Arial" pitchFamily="34" charset="0"/>
+                  <a:ea typeface="ＭＳ Ｐゴシック" pitchFamily="34" charset="-128"/>
+                  <a:cs typeface="+mn-cs"/>
+                </a:defRPr>
+              </a:lvl3pPr>
+              <a:lvl4pPr marL="1371600" algn="l" rtl="0" fontAlgn="base">
+                <a:spcBef>
+                  <a:spcPct val="0"/>
+                </a:spcBef>
+                <a:spcAft>
+                  <a:spcPct val="0"/>
+                </a:spcAft>
+                <a:defRPr kern="1200">
+                  <a:solidFill>
+                    <a:schemeClr val="tx1"/>
+                  </a:solidFill>
+                  <a:latin typeface="Arial" pitchFamily="34" charset="0"/>
+                  <a:ea typeface="ＭＳ Ｐゴシック" pitchFamily="34" charset="-128"/>
+                  <a:cs typeface="+mn-cs"/>
+                </a:defRPr>
+              </a:lvl4pPr>
+              <a:lvl5pPr marL="1828800" algn="l" rtl="0" fontAlgn="base">
+                <a:spcBef>
+                  <a:spcPct val="0"/>
+                </a:spcBef>
+                <a:spcAft>
+                  <a:spcPct val="0"/>
+                </a:spcAft>
+                <a:defRPr kern="1200">
+                  <a:solidFill>
+                    <a:schemeClr val="tx1"/>
+                  </a:solidFill>
+                  <a:latin typeface="Arial" pitchFamily="34" charset="0"/>
+                  <a:ea typeface="ＭＳ Ｐゴシック" pitchFamily="34" charset="-128"/>
+                  <a:cs typeface="+mn-cs"/>
+                </a:defRPr>
+              </a:lvl5pPr>
+              <a:lvl6pPr marL="2286000" algn="l" defTabSz="914400" rtl="0" eaLnBrk="1" latinLnBrk="0" hangingPunct="1">
+                <a:defRPr kern="1200">
+                  <a:solidFill>
+                    <a:schemeClr val="tx1"/>
+                  </a:solidFill>
+                  <a:latin typeface="Arial" pitchFamily="34" charset="0"/>
+                  <a:ea typeface="ＭＳ Ｐゴシック" pitchFamily="34" charset="-128"/>
+                  <a:cs typeface="+mn-cs"/>
+                </a:defRPr>
+              </a:lvl6pPr>
+              <a:lvl7pPr marL="2743200" algn="l" defTabSz="914400" rtl="0" eaLnBrk="1" latinLnBrk="0" hangingPunct="1">
+                <a:defRPr kern="1200">
+                  <a:solidFill>
+                    <a:schemeClr val="tx1"/>
+                  </a:solidFill>
+                  <a:latin typeface="Arial" pitchFamily="34" charset="0"/>
+                  <a:ea typeface="ＭＳ Ｐゴシック" pitchFamily="34" charset="-128"/>
+                  <a:cs typeface="+mn-cs"/>
+                </a:defRPr>
+              </a:lvl7pPr>
+              <a:lvl8pPr marL="3200400" algn="l" defTabSz="914400" rtl="0" eaLnBrk="1" latinLnBrk="0" hangingPunct="1">
+                <a:defRPr kern="1200">
+                  <a:solidFill>
+                    <a:schemeClr val="tx1"/>
+                  </a:solidFill>
+                  <a:latin typeface="Arial" pitchFamily="34" charset="0"/>
+                  <a:ea typeface="ＭＳ Ｐゴシック" pitchFamily="34" charset="-128"/>
+                  <a:cs typeface="+mn-cs"/>
+                </a:defRPr>
+              </a:lvl8pPr>
+              <a:lvl9pPr marL="3657600" algn="l" defTabSz="914400" rtl="0" eaLnBrk="1" latinLnBrk="0" hangingPunct="1">
+                <a:defRPr kern="1200">
+                  <a:solidFill>
+                    <a:schemeClr val="tx1"/>
+                  </a:solidFill>
+                  <a:latin typeface="Arial" pitchFamily="34" charset="0"/>
+                  <a:ea typeface="ＭＳ Ｐゴシック" pitchFamily="34" charset="-128"/>
+                  <a:cs typeface="+mn-cs"/>
+                </a:defRPr>
+              </a:lvl9pPr>
+            </a:lstStyle>
+            <a:p>
+              <a:pPr algn="ctr">
+                <a:spcBef>
+                  <a:spcPts val="0"/>
+                </a:spcBef>
+                <a:spcAft>
+                  <a:spcPts val="0"/>
+                </a:spcAft>
+                <a:defRPr/>
+              </a:pPr>
+              <a:r>
+                <a:rPr lang="en-US" sz="2000" dirty="0">
+                  <a:solidFill>
+                    <a:srgbClr val="000000"/>
+                  </a:solidFill>
+                  <a:latin typeface="Arial" pitchFamily="34"/>
+                  <a:ea typeface="Arial Unicode MS" pitchFamily="2"/>
+                  <a:cs typeface="Arial" pitchFamily="34"/>
+                </a:rPr>
+                <a:t>Instrumentation wrapper</a:t>
+              </a:r>
             </a:p>
           </p:txBody>
         </p:sp>

</xml_diff>